<commit_message>
plot mcmc z from clustering first
</commit_message>
<xml_diff>
--- a/v6/figs/test-data-1.pptx
+++ b/v6/figs/test-data-1.pptx
@@ -6,6 +6,7 @@
   </p:sldMasterIdLst>
   <p:sldIdLst>
     <p:sldId id="256" r:id="rId2"/>
+    <p:sldId id="257" r:id="rId3"/>
   </p:sldIdLst>
   <p:sldSz cx="12192000" cy="6858000"/>
   <p:notesSz cx="6858000" cy="9144000"/>
@@ -104,6 +105,11 @@
       </a:defRPr>
     </a:lvl9pPr>
   </p:defaultTextStyle>
+  <p:extLst>
+    <p:ext uri="{EFAFB233-063F-42B5-8137-9DF3F51BA10A}">
+      <p15:sldGuideLst xmlns:p15="http://schemas.microsoft.com/office/powerpoint/2012/main"/>
+    </p:ext>
+  </p:extLst>
 </p:presentation>
 </file>
 
@@ -254,7 +260,7 @@
           <a:p>
             <a:fld id="{61B16F4C-C331-6548-96FB-81D0C6C1BA52}" type="datetimeFigureOut">
               <a:rPr lang="en-US" smtClean="0"/>
-              <a:t>1/14/20</a:t>
+              <a:t>1/15/20</a:t>
             </a:fld>
             <a:endParaRPr lang="en-US"/>
           </a:p>
@@ -452,7 +458,7 @@
           <a:p>
             <a:fld id="{61B16F4C-C331-6548-96FB-81D0C6C1BA52}" type="datetimeFigureOut">
               <a:rPr lang="en-US" smtClean="0"/>
-              <a:t>1/14/20</a:t>
+              <a:t>1/15/20</a:t>
             </a:fld>
             <a:endParaRPr lang="en-US"/>
           </a:p>
@@ -660,7 +666,7 @@
           <a:p>
             <a:fld id="{61B16F4C-C331-6548-96FB-81D0C6C1BA52}" type="datetimeFigureOut">
               <a:rPr lang="en-US" smtClean="0"/>
-              <a:t>1/14/20</a:t>
+              <a:t>1/15/20</a:t>
             </a:fld>
             <a:endParaRPr lang="en-US"/>
           </a:p>
@@ -858,7 +864,7 @@
           <a:p>
             <a:fld id="{61B16F4C-C331-6548-96FB-81D0C6C1BA52}" type="datetimeFigureOut">
               <a:rPr lang="en-US" smtClean="0"/>
-              <a:t>1/14/20</a:t>
+              <a:t>1/15/20</a:t>
             </a:fld>
             <a:endParaRPr lang="en-US"/>
           </a:p>
@@ -1133,7 +1139,7 @@
           <a:p>
             <a:fld id="{61B16F4C-C331-6548-96FB-81D0C6C1BA52}" type="datetimeFigureOut">
               <a:rPr lang="en-US" smtClean="0"/>
-              <a:t>1/14/20</a:t>
+              <a:t>1/15/20</a:t>
             </a:fld>
             <a:endParaRPr lang="en-US"/>
           </a:p>
@@ -1398,7 +1404,7 @@
           <a:p>
             <a:fld id="{61B16F4C-C331-6548-96FB-81D0C6C1BA52}" type="datetimeFigureOut">
               <a:rPr lang="en-US" smtClean="0"/>
-              <a:t>1/14/20</a:t>
+              <a:t>1/15/20</a:t>
             </a:fld>
             <a:endParaRPr lang="en-US"/>
           </a:p>
@@ -1810,7 +1816,7 @@
           <a:p>
             <a:fld id="{61B16F4C-C331-6548-96FB-81D0C6C1BA52}" type="datetimeFigureOut">
               <a:rPr lang="en-US" smtClean="0"/>
-              <a:t>1/14/20</a:t>
+              <a:t>1/15/20</a:t>
             </a:fld>
             <a:endParaRPr lang="en-US"/>
           </a:p>
@@ -1951,7 +1957,7 @@
           <a:p>
             <a:fld id="{61B16F4C-C331-6548-96FB-81D0C6C1BA52}" type="datetimeFigureOut">
               <a:rPr lang="en-US" smtClean="0"/>
-              <a:t>1/14/20</a:t>
+              <a:t>1/15/20</a:t>
             </a:fld>
             <a:endParaRPr lang="en-US"/>
           </a:p>
@@ -2064,7 +2070,7 @@
           <a:p>
             <a:fld id="{61B16F4C-C331-6548-96FB-81D0C6C1BA52}" type="datetimeFigureOut">
               <a:rPr lang="en-US" smtClean="0"/>
-              <a:t>1/14/20</a:t>
+              <a:t>1/15/20</a:t>
             </a:fld>
             <a:endParaRPr lang="en-US"/>
           </a:p>
@@ -2375,7 +2381,7 @@
           <a:p>
             <a:fld id="{61B16F4C-C331-6548-96FB-81D0C6C1BA52}" type="datetimeFigureOut">
               <a:rPr lang="en-US" smtClean="0"/>
-              <a:t>1/14/20</a:t>
+              <a:t>1/15/20</a:t>
             </a:fld>
             <a:endParaRPr lang="en-US"/>
           </a:p>
@@ -2663,7 +2669,7 @@
           <a:p>
             <a:fld id="{61B16F4C-C331-6548-96FB-81D0C6C1BA52}" type="datetimeFigureOut">
               <a:rPr lang="en-US" smtClean="0"/>
-              <a:t>1/14/20</a:t>
+              <a:t>1/15/20</a:t>
             </a:fld>
             <a:endParaRPr lang="en-US"/>
           </a:p>
@@ -2904,7 +2910,7 @@
           <a:p>
             <a:fld id="{61B16F4C-C331-6548-96FB-81D0C6C1BA52}" type="datetimeFigureOut">
               <a:rPr lang="en-US" smtClean="0"/>
-              <a:t>1/14/20</a:t>
+              <a:t>1/15/20</a:t>
             </a:fld>
             <a:endParaRPr lang="en-US"/>
           </a:p>
@@ -3335,7 +3341,7 @@
         </p:nvSpPr>
         <p:spPr>
           <a:xfrm>
-            <a:off x="2856215" y="1461296"/>
+            <a:off x="2534097" y="1482078"/>
             <a:ext cx="493160" cy="493160"/>
           </a:xfrm>
           <a:prstGeom prst="ellipse">
@@ -3394,7 +3400,7 @@
         </p:nvSpPr>
         <p:spPr>
           <a:xfrm>
-            <a:off x="2856215" y="2219871"/>
+            <a:off x="2534097" y="2240653"/>
             <a:ext cx="493160" cy="493160"/>
           </a:xfrm>
           <a:prstGeom prst="ellipse">
@@ -3453,7 +3459,7 @@
         </p:nvSpPr>
         <p:spPr>
           <a:xfrm>
-            <a:off x="1941815" y="3175369"/>
+            <a:off x="1619697" y="3196151"/>
             <a:ext cx="493160" cy="493160"/>
           </a:xfrm>
           <a:prstGeom prst="ellipse">
@@ -3512,7 +3518,7 @@
         </p:nvSpPr>
         <p:spPr>
           <a:xfrm>
-            <a:off x="3637052" y="3175369"/>
+            <a:off x="3314934" y="3196151"/>
             <a:ext cx="493160" cy="493160"/>
           </a:xfrm>
           <a:prstGeom prst="ellipse">
@@ -3571,7 +3577,7 @@
         </p:nvSpPr>
         <p:spPr>
           <a:xfrm>
-            <a:off x="3637052" y="3955347"/>
+            <a:off x="3314934" y="3976129"/>
             <a:ext cx="493160" cy="493160"/>
           </a:xfrm>
           <a:prstGeom prst="ellipse">
@@ -3630,7 +3636,7 @@
         </p:nvSpPr>
         <p:spPr>
           <a:xfrm>
-            <a:off x="1448655" y="3955347"/>
+            <a:off x="1126537" y="3976129"/>
             <a:ext cx="493160" cy="493160"/>
           </a:xfrm>
           <a:prstGeom prst="ellipse">
@@ -3689,7 +3695,7 @@
         </p:nvSpPr>
         <p:spPr>
           <a:xfrm>
-            <a:off x="2363055" y="3955347"/>
+            <a:off x="2040937" y="3976129"/>
             <a:ext cx="493160" cy="493160"/>
           </a:xfrm>
           <a:prstGeom prst="ellipse">
@@ -3748,7 +3754,7 @@
         </p:nvSpPr>
         <p:spPr>
           <a:xfrm>
-            <a:off x="1448655" y="4910845"/>
+            <a:off x="1126537" y="4931627"/>
             <a:ext cx="493160" cy="493160"/>
           </a:xfrm>
           <a:prstGeom prst="ellipse">
@@ -3807,7 +3813,7 @@
         </p:nvSpPr>
         <p:spPr>
           <a:xfrm>
-            <a:off x="2363055" y="4910845"/>
+            <a:off x="2040937" y="4931627"/>
             <a:ext cx="493160" cy="493160"/>
           </a:xfrm>
           <a:prstGeom prst="ellipse">
@@ -3866,7 +3872,7 @@
         </p:nvSpPr>
         <p:spPr>
           <a:xfrm>
-            <a:off x="3637051" y="4910845"/>
+            <a:off x="3314933" y="4931627"/>
             <a:ext cx="493160" cy="493160"/>
           </a:xfrm>
           <a:prstGeom prst="ellipse">
@@ -3928,7 +3934,7 @@
         </p:nvCxnSpPr>
         <p:spPr>
           <a:xfrm>
-            <a:off x="3883632" y="3668529"/>
+            <a:off x="3561514" y="3689311"/>
             <a:ext cx="0" cy="286818"/>
           </a:xfrm>
           <a:prstGeom prst="straightConnector1">
@@ -3974,7 +3980,7 @@
         </p:nvCxnSpPr>
         <p:spPr>
           <a:xfrm flipH="1">
-            <a:off x="3883631" y="4448507"/>
+            <a:off x="3561513" y="4469289"/>
             <a:ext cx="1" cy="462338"/>
           </a:xfrm>
           <a:prstGeom prst="straightConnector1">
@@ -4020,7 +4026,7 @@
         </p:nvCxnSpPr>
         <p:spPr>
           <a:xfrm>
-            <a:off x="2609635" y="4448507"/>
+            <a:off x="2287517" y="4469289"/>
             <a:ext cx="0" cy="462338"/>
           </a:xfrm>
           <a:prstGeom prst="straightConnector1">
@@ -4066,7 +4072,7 @@
         </p:nvCxnSpPr>
         <p:spPr>
           <a:xfrm>
-            <a:off x="2188395" y="3668529"/>
+            <a:off x="1866277" y="3689311"/>
             <a:ext cx="421240" cy="286818"/>
           </a:xfrm>
           <a:prstGeom prst="straightConnector1">
@@ -4112,7 +4118,7 @@
         </p:nvCxnSpPr>
         <p:spPr>
           <a:xfrm flipH="1">
-            <a:off x="1695235" y="3668529"/>
+            <a:off x="1373117" y="3689311"/>
             <a:ext cx="493160" cy="286818"/>
           </a:xfrm>
           <a:prstGeom prst="straightConnector1">
@@ -4158,7 +4164,7 @@
         </p:nvCxnSpPr>
         <p:spPr>
           <a:xfrm>
-            <a:off x="1695235" y="4448507"/>
+            <a:off x="1373117" y="4469289"/>
             <a:ext cx="0" cy="462338"/>
           </a:xfrm>
           <a:prstGeom prst="straightConnector1">
@@ -4204,7 +4210,7 @@
         </p:nvCxnSpPr>
         <p:spPr>
           <a:xfrm>
-            <a:off x="3102795" y="1954456"/>
+            <a:off x="2780677" y="1975238"/>
             <a:ext cx="0" cy="265415"/>
           </a:xfrm>
           <a:prstGeom prst="straightConnector1">
@@ -4250,7 +4256,7 @@
         </p:nvCxnSpPr>
         <p:spPr>
           <a:xfrm>
-            <a:off x="3102795" y="2713031"/>
+            <a:off x="2780677" y="2733813"/>
             <a:ext cx="780837" cy="462338"/>
           </a:xfrm>
           <a:prstGeom prst="straightConnector1">
@@ -4296,7 +4302,7 @@
         </p:nvCxnSpPr>
         <p:spPr>
           <a:xfrm flipH="1">
-            <a:off x="2188395" y="2713031"/>
+            <a:off x="1866277" y="2733813"/>
             <a:ext cx="914400" cy="462338"/>
           </a:xfrm>
           <a:prstGeom prst="straightConnector1">
@@ -4340,7 +4346,7 @@
         </p:nvCxnSpPr>
         <p:spPr>
           <a:xfrm>
-            <a:off x="1089062" y="2889405"/>
+            <a:off x="766944" y="2910187"/>
             <a:ext cx="3493213" cy="0"/>
           </a:xfrm>
           <a:prstGeom prst="line">
@@ -4381,7 +4387,7 @@
         </p:nvCxnSpPr>
         <p:spPr>
           <a:xfrm>
-            <a:off x="1089062" y="4624026"/>
+            <a:off x="766944" y="4644808"/>
             <a:ext cx="3493213" cy="0"/>
           </a:xfrm>
           <a:prstGeom prst="line">
@@ -4422,7 +4428,7 @@
         </p:nvCxnSpPr>
         <p:spPr>
           <a:xfrm>
-            <a:off x="3102795" y="2889405"/>
+            <a:off x="2780677" y="2910187"/>
             <a:ext cx="0" cy="2671281"/>
           </a:xfrm>
           <a:prstGeom prst="line">
@@ -4463,7 +4469,7 @@
         </p:nvCxnSpPr>
         <p:spPr>
           <a:xfrm>
-            <a:off x="2114766" y="4647144"/>
+            <a:off x="1792648" y="4667926"/>
             <a:ext cx="0" cy="913542"/>
           </a:xfrm>
           <a:prstGeom prst="line">
@@ -4502,7 +4508,7 @@
         </p:nvSpPr>
         <p:spPr>
           <a:xfrm>
-            <a:off x="1089062" y="1461295"/>
+            <a:off x="766944" y="1482077"/>
             <a:ext cx="976549" cy="338554"/>
           </a:xfrm>
           <a:prstGeom prst="rect">
@@ -4541,7 +4547,7 @@
         </p:nvSpPr>
         <p:spPr>
           <a:xfrm>
-            <a:off x="1045114" y="2966282"/>
+            <a:off x="722996" y="2987064"/>
             <a:ext cx="679994" cy="338554"/>
           </a:xfrm>
           <a:prstGeom prst="rect">
@@ -4580,7 +4586,7 @@
         </p:nvSpPr>
         <p:spPr>
           <a:xfrm>
-            <a:off x="4176193" y="2966282"/>
+            <a:off x="3854075" y="2987064"/>
             <a:ext cx="679994" cy="338554"/>
           </a:xfrm>
           <a:prstGeom prst="rect">
@@ -4619,7 +4625,7 @@
         </p:nvSpPr>
         <p:spPr>
           <a:xfrm>
-            <a:off x="1045595" y="4637233"/>
+            <a:off x="723477" y="4658015"/>
             <a:ext cx="383438" cy="338554"/>
           </a:xfrm>
           <a:prstGeom prst="rect">
@@ -4658,7 +4664,7 @@
         </p:nvSpPr>
         <p:spPr>
           <a:xfrm>
-            <a:off x="2141634" y="4647144"/>
+            <a:off x="1819516" y="4667926"/>
             <a:ext cx="383438" cy="338554"/>
           </a:xfrm>
           <a:prstGeom prst="rect">
@@ -4697,7 +4703,7 @@
         </p:nvSpPr>
         <p:spPr>
           <a:xfrm>
-            <a:off x="3148304" y="4635401"/>
+            <a:off x="2826186" y="4656183"/>
             <a:ext cx="383438" cy="338554"/>
           </a:xfrm>
           <a:prstGeom prst="rect">
@@ -4737,7 +4743,7 @@
           <p:nvPr>
             <p:extLst>
               <p:ext uri="{D42A27DB-BD31-4B8C-83A1-F6EECF244321}">
-                <p14:modId xmlns:p14="http://schemas.microsoft.com/office/powerpoint/2010/main" val="1756307412"/>
+                <p14:modId xmlns:p14="http://schemas.microsoft.com/office/powerpoint/2010/main" val="2414483471"/>
               </p:ext>
             </p:extLst>
           </p:nvPr>
@@ -4959,7 +4965,7 @@
                       <a:pPr algn="ctr"/>
                       <a:r>
                         <a:rPr lang="en-US" dirty="0"/>
-                        <a:t>0.85</a:t>
+                        <a:t>0.82</a:t>
                       </a:r>
                     </a:p>
                   </a:txBody>
@@ -5479,8 +5485,8 @@
           </a:graphicData>
         </a:graphic>
       </p:graphicFrame>
-      <mc:AlternateContent xmlns:mc="http://schemas.openxmlformats.org/markup-compatibility/2006">
-        <mc:Choice xmlns:a14="http://schemas.microsoft.com/office/drawing/2010/main" Requires="a14">
+      <mc:AlternateContent xmlns:mc="http://schemas.openxmlformats.org/markup-compatibility/2006" xmlns:a14="http://schemas.microsoft.com/office/drawing/2010/main">
+        <mc:Choice Requires="a14">
           <p:sp>
             <p:nvSpPr>
               <p:cNvPr id="67" name="TextBox 66">
@@ -5531,7 +5537,7 @@
             </p:txBody>
           </p:sp>
         </mc:Choice>
-        <mc:Fallback>
+        <mc:Fallback xmlns="">
           <p:sp>
             <p:nvSpPr>
               <p:cNvPr id="67" name="TextBox 66">
@@ -5576,10 +5582,1576 @@
           </p:sp>
         </mc:Fallback>
       </mc:AlternateContent>
+      <p:sp>
+        <p:nvSpPr>
+          <p:cNvPr id="2" name="TextBox 1">
+            <a:extLst>
+              <a:ext uri="{FF2B5EF4-FFF2-40B4-BE49-F238E27FC236}">
+                <a16:creationId xmlns:a16="http://schemas.microsoft.com/office/drawing/2014/main" id="{73C08416-EB80-C540-8B6D-DDAD41068257}"/>
+              </a:ext>
+            </a:extLst>
+          </p:cNvPr>
+          <p:cNvSpPr txBox="1"/>
+          <p:nvPr/>
+        </p:nvSpPr>
+        <p:spPr>
+          <a:xfrm>
+            <a:off x="5822334" y="6152409"/>
+            <a:ext cx="4736040" cy="369332"/>
+          </a:xfrm>
+          <a:prstGeom prst="rect">
+            <a:avLst/>
+          </a:prstGeom>
+          <a:noFill/>
+        </p:spPr>
+        <p:txBody>
+          <a:bodyPr wrap="none" rtlCol="0">
+            <a:spAutoFit/>
+          </a:bodyPr>
+          <a:lstStyle/>
+          <a:p>
+            <a:r>
+              <a:rPr lang="en-US" dirty="0"/>
+              <a:t>Simulated data: 100 variants total, 10 per cluster</a:t>
+            </a:r>
+          </a:p>
+        </p:txBody>
+      </p:sp>
     </p:spTree>
     <p:extLst>
       <p:ext uri="{BB962C8B-B14F-4D97-AF65-F5344CB8AC3E}">
         <p14:creationId xmlns:p14="http://schemas.microsoft.com/office/powerpoint/2010/main" val="2665743579"/>
+      </p:ext>
+    </p:extLst>
+  </p:cSld>
+  <p:clrMapOvr>
+    <a:masterClrMapping/>
+  </p:clrMapOvr>
+</p:sld>
+</file>
+
+<file path=ppt/slides/slide2.xml><?xml version="1.0" encoding="utf-8"?>
+<p:sld xmlns:a="http://schemas.openxmlformats.org/drawingml/2006/main" xmlns:r="http://schemas.openxmlformats.org/officeDocument/2006/relationships" xmlns:p="http://schemas.openxmlformats.org/presentationml/2006/main">
+  <p:cSld>
+    <p:spTree>
+      <p:nvGrpSpPr>
+        <p:cNvPr id="1" name=""/>
+        <p:cNvGrpSpPr/>
+        <p:nvPr/>
+      </p:nvGrpSpPr>
+      <p:grpSpPr>
+        <a:xfrm>
+          <a:off x="0" y="0"/>
+          <a:ext cx="0" cy="0"/>
+          <a:chOff x="0" y="0"/>
+          <a:chExt cx="0" cy="0"/>
+        </a:xfrm>
+      </p:grpSpPr>
+      <p:pic>
+        <p:nvPicPr>
+          <p:cNvPr id="2" name="Picture 1">
+            <a:extLst>
+              <a:ext uri="{FF2B5EF4-FFF2-40B4-BE49-F238E27FC236}">
+                <a16:creationId xmlns:a16="http://schemas.microsoft.com/office/drawing/2014/main" id="{16878474-67E9-C441-8B7C-BA6FCBB0F528}"/>
+              </a:ext>
+            </a:extLst>
+          </p:cNvPr>
+          <p:cNvPicPr>
+            <a:picLocks noChangeAspect="1"/>
+          </p:cNvPicPr>
+          <p:nvPr/>
+        </p:nvPicPr>
+        <p:blipFill>
+          <a:blip r:embed="rId2"/>
+          <a:stretch>
+            <a:fillRect/>
+          </a:stretch>
+        </p:blipFill>
+        <p:spPr>
+          <a:xfrm>
+            <a:off x="4934164" y="987713"/>
+            <a:ext cx="7263206" cy="4882573"/>
+          </a:xfrm>
+          <a:prstGeom prst="rect">
+            <a:avLst/>
+          </a:prstGeom>
+        </p:spPr>
+      </p:pic>
+      <p:sp>
+        <p:nvSpPr>
+          <p:cNvPr id="32" name="Oval 31">
+            <a:extLst>
+              <a:ext uri="{FF2B5EF4-FFF2-40B4-BE49-F238E27FC236}">
+                <a16:creationId xmlns:a16="http://schemas.microsoft.com/office/drawing/2014/main" id="{76AAB362-BB57-964F-BE7E-DCC3214D8B9E}"/>
+              </a:ext>
+            </a:extLst>
+          </p:cNvPr>
+          <p:cNvSpPr/>
+          <p:nvPr/>
+        </p:nvSpPr>
+        <p:spPr>
+          <a:xfrm>
+            <a:off x="2534097" y="1482078"/>
+            <a:ext cx="493160" cy="493160"/>
+          </a:xfrm>
+          <a:prstGeom prst="ellipse">
+            <a:avLst/>
+          </a:prstGeom>
+          <a:noFill/>
+          <a:ln>
+            <a:solidFill>
+              <a:schemeClr val="tx1"/>
+            </a:solidFill>
+          </a:ln>
+        </p:spPr>
+        <p:style>
+          <a:lnRef idx="2">
+            <a:schemeClr val="accent1">
+              <a:shade val="50000"/>
+            </a:schemeClr>
+          </a:lnRef>
+          <a:fillRef idx="1">
+            <a:schemeClr val="accent1"/>
+          </a:fillRef>
+          <a:effectRef idx="0">
+            <a:schemeClr val="accent1"/>
+          </a:effectRef>
+          <a:fontRef idx="minor">
+            <a:schemeClr val="lt1"/>
+          </a:fontRef>
+        </p:style>
+        <p:txBody>
+          <a:bodyPr rtlCol="0" anchor="ctr"/>
+          <a:lstStyle/>
+          <a:p>
+            <a:pPr algn="ctr"/>
+            <a:r>
+              <a:rPr lang="en-US" dirty="0">
+                <a:solidFill>
+                  <a:schemeClr val="tx1"/>
+                </a:solidFill>
+              </a:rPr>
+              <a:t>1</a:t>
+            </a:r>
+          </a:p>
+        </p:txBody>
+      </p:sp>
+      <p:sp>
+        <p:nvSpPr>
+          <p:cNvPr id="33" name="Oval 32">
+            <a:extLst>
+              <a:ext uri="{FF2B5EF4-FFF2-40B4-BE49-F238E27FC236}">
+                <a16:creationId xmlns:a16="http://schemas.microsoft.com/office/drawing/2014/main" id="{7655B9DE-335F-D34C-BDD6-3F5EB1ECCABC}"/>
+              </a:ext>
+            </a:extLst>
+          </p:cNvPr>
+          <p:cNvSpPr/>
+          <p:nvPr/>
+        </p:nvSpPr>
+        <p:spPr>
+          <a:xfrm>
+            <a:off x="2534097" y="2240653"/>
+            <a:ext cx="493160" cy="493160"/>
+          </a:xfrm>
+          <a:prstGeom prst="ellipse">
+            <a:avLst/>
+          </a:prstGeom>
+          <a:noFill/>
+          <a:ln>
+            <a:solidFill>
+              <a:schemeClr val="tx1"/>
+            </a:solidFill>
+          </a:ln>
+        </p:spPr>
+        <p:style>
+          <a:lnRef idx="2">
+            <a:schemeClr val="accent1">
+              <a:shade val="50000"/>
+            </a:schemeClr>
+          </a:lnRef>
+          <a:fillRef idx="1">
+            <a:schemeClr val="accent1"/>
+          </a:fillRef>
+          <a:effectRef idx="0">
+            <a:schemeClr val="accent1"/>
+          </a:effectRef>
+          <a:fontRef idx="minor">
+            <a:schemeClr val="lt1"/>
+          </a:fontRef>
+        </p:style>
+        <p:txBody>
+          <a:bodyPr rtlCol="0" anchor="ctr"/>
+          <a:lstStyle/>
+          <a:p>
+            <a:pPr algn="ctr"/>
+            <a:r>
+              <a:rPr lang="en-US" dirty="0">
+                <a:solidFill>
+                  <a:schemeClr val="tx1"/>
+                </a:solidFill>
+              </a:rPr>
+              <a:t>2</a:t>
+            </a:r>
+          </a:p>
+        </p:txBody>
+      </p:sp>
+      <p:sp>
+        <p:nvSpPr>
+          <p:cNvPr id="34" name="Oval 33">
+            <a:extLst>
+              <a:ext uri="{FF2B5EF4-FFF2-40B4-BE49-F238E27FC236}">
+                <a16:creationId xmlns:a16="http://schemas.microsoft.com/office/drawing/2014/main" id="{903CD4F1-6ADC-374B-A71B-5B9A284FC46F}"/>
+              </a:ext>
+            </a:extLst>
+          </p:cNvPr>
+          <p:cNvSpPr/>
+          <p:nvPr/>
+        </p:nvSpPr>
+        <p:spPr>
+          <a:xfrm>
+            <a:off x="1619697" y="3196151"/>
+            <a:ext cx="493160" cy="493160"/>
+          </a:xfrm>
+          <a:prstGeom prst="ellipse">
+            <a:avLst/>
+          </a:prstGeom>
+          <a:noFill/>
+          <a:ln>
+            <a:solidFill>
+              <a:schemeClr val="tx1"/>
+            </a:solidFill>
+          </a:ln>
+        </p:spPr>
+        <p:style>
+          <a:lnRef idx="2">
+            <a:schemeClr val="accent1">
+              <a:shade val="50000"/>
+            </a:schemeClr>
+          </a:lnRef>
+          <a:fillRef idx="1">
+            <a:schemeClr val="accent1"/>
+          </a:fillRef>
+          <a:effectRef idx="0">
+            <a:schemeClr val="accent1"/>
+          </a:effectRef>
+          <a:fontRef idx="minor">
+            <a:schemeClr val="lt1"/>
+          </a:fontRef>
+        </p:style>
+        <p:txBody>
+          <a:bodyPr rtlCol="0" anchor="ctr"/>
+          <a:lstStyle/>
+          <a:p>
+            <a:pPr algn="ctr"/>
+            <a:r>
+              <a:rPr lang="en-US" dirty="0">
+                <a:solidFill>
+                  <a:schemeClr val="tx1"/>
+                </a:solidFill>
+              </a:rPr>
+              <a:t>3</a:t>
+            </a:r>
+          </a:p>
+        </p:txBody>
+      </p:sp>
+      <p:sp>
+        <p:nvSpPr>
+          <p:cNvPr id="35" name="Oval 34">
+            <a:extLst>
+              <a:ext uri="{FF2B5EF4-FFF2-40B4-BE49-F238E27FC236}">
+                <a16:creationId xmlns:a16="http://schemas.microsoft.com/office/drawing/2014/main" id="{0DE64844-DF82-5F4B-8930-F9E875C42758}"/>
+              </a:ext>
+            </a:extLst>
+          </p:cNvPr>
+          <p:cNvSpPr/>
+          <p:nvPr/>
+        </p:nvSpPr>
+        <p:spPr>
+          <a:xfrm>
+            <a:off x="3314934" y="3196151"/>
+            <a:ext cx="493160" cy="493160"/>
+          </a:xfrm>
+          <a:prstGeom prst="ellipse">
+            <a:avLst/>
+          </a:prstGeom>
+          <a:noFill/>
+          <a:ln>
+            <a:solidFill>
+              <a:schemeClr val="tx1"/>
+            </a:solidFill>
+          </a:ln>
+        </p:spPr>
+        <p:style>
+          <a:lnRef idx="2">
+            <a:schemeClr val="accent1">
+              <a:shade val="50000"/>
+            </a:schemeClr>
+          </a:lnRef>
+          <a:fillRef idx="1">
+            <a:schemeClr val="accent1"/>
+          </a:fillRef>
+          <a:effectRef idx="0">
+            <a:schemeClr val="accent1"/>
+          </a:effectRef>
+          <a:fontRef idx="minor">
+            <a:schemeClr val="lt1"/>
+          </a:fontRef>
+        </p:style>
+        <p:txBody>
+          <a:bodyPr rtlCol="0" anchor="ctr"/>
+          <a:lstStyle/>
+          <a:p>
+            <a:pPr algn="ctr"/>
+            <a:r>
+              <a:rPr lang="en-US" dirty="0">
+                <a:solidFill>
+                  <a:schemeClr val="tx1"/>
+                </a:solidFill>
+              </a:rPr>
+              <a:t>6</a:t>
+            </a:r>
+          </a:p>
+        </p:txBody>
+      </p:sp>
+      <p:sp>
+        <p:nvSpPr>
+          <p:cNvPr id="36" name="Oval 35">
+            <a:extLst>
+              <a:ext uri="{FF2B5EF4-FFF2-40B4-BE49-F238E27FC236}">
+                <a16:creationId xmlns:a16="http://schemas.microsoft.com/office/drawing/2014/main" id="{FC732AAA-1D7C-FE4C-A4F3-6F49F2B9128B}"/>
+              </a:ext>
+            </a:extLst>
+          </p:cNvPr>
+          <p:cNvSpPr/>
+          <p:nvPr/>
+        </p:nvSpPr>
+        <p:spPr>
+          <a:xfrm>
+            <a:off x="3314934" y="3976129"/>
+            <a:ext cx="493160" cy="493160"/>
+          </a:xfrm>
+          <a:prstGeom prst="ellipse">
+            <a:avLst/>
+          </a:prstGeom>
+          <a:noFill/>
+          <a:ln>
+            <a:solidFill>
+              <a:schemeClr val="tx1"/>
+            </a:solidFill>
+          </a:ln>
+        </p:spPr>
+        <p:style>
+          <a:lnRef idx="2">
+            <a:schemeClr val="accent1">
+              <a:shade val="50000"/>
+            </a:schemeClr>
+          </a:lnRef>
+          <a:fillRef idx="1">
+            <a:schemeClr val="accent1"/>
+          </a:fillRef>
+          <a:effectRef idx="0">
+            <a:schemeClr val="accent1"/>
+          </a:effectRef>
+          <a:fontRef idx="minor">
+            <a:schemeClr val="lt1"/>
+          </a:fontRef>
+        </p:style>
+        <p:txBody>
+          <a:bodyPr rtlCol="0" anchor="ctr"/>
+          <a:lstStyle/>
+          <a:p>
+            <a:pPr algn="ctr"/>
+            <a:r>
+              <a:rPr lang="en-US" dirty="0">
+                <a:solidFill>
+                  <a:schemeClr val="tx1"/>
+                </a:solidFill>
+              </a:rPr>
+              <a:t>7</a:t>
+            </a:r>
+          </a:p>
+        </p:txBody>
+      </p:sp>
+      <p:sp>
+        <p:nvSpPr>
+          <p:cNvPr id="37" name="Oval 36">
+            <a:extLst>
+              <a:ext uri="{FF2B5EF4-FFF2-40B4-BE49-F238E27FC236}">
+                <a16:creationId xmlns:a16="http://schemas.microsoft.com/office/drawing/2014/main" id="{70C22177-D46E-1149-8BDD-48FA0C0AFB3F}"/>
+              </a:ext>
+            </a:extLst>
+          </p:cNvPr>
+          <p:cNvSpPr/>
+          <p:nvPr/>
+        </p:nvSpPr>
+        <p:spPr>
+          <a:xfrm>
+            <a:off x="1126537" y="3976129"/>
+            <a:ext cx="493160" cy="493160"/>
+          </a:xfrm>
+          <a:prstGeom prst="ellipse">
+            <a:avLst/>
+          </a:prstGeom>
+          <a:noFill/>
+          <a:ln>
+            <a:solidFill>
+              <a:schemeClr val="tx1"/>
+            </a:solidFill>
+          </a:ln>
+        </p:spPr>
+        <p:style>
+          <a:lnRef idx="2">
+            <a:schemeClr val="accent1">
+              <a:shade val="50000"/>
+            </a:schemeClr>
+          </a:lnRef>
+          <a:fillRef idx="1">
+            <a:schemeClr val="accent1"/>
+          </a:fillRef>
+          <a:effectRef idx="0">
+            <a:schemeClr val="accent1"/>
+          </a:effectRef>
+          <a:fontRef idx="minor">
+            <a:schemeClr val="lt1"/>
+          </a:fontRef>
+        </p:style>
+        <p:txBody>
+          <a:bodyPr rtlCol="0" anchor="ctr"/>
+          <a:lstStyle/>
+          <a:p>
+            <a:pPr algn="ctr"/>
+            <a:r>
+              <a:rPr lang="en-US" dirty="0">
+                <a:solidFill>
+                  <a:schemeClr val="tx1"/>
+                </a:solidFill>
+              </a:rPr>
+              <a:t>4</a:t>
+            </a:r>
+          </a:p>
+        </p:txBody>
+      </p:sp>
+      <p:sp>
+        <p:nvSpPr>
+          <p:cNvPr id="38" name="Oval 37">
+            <a:extLst>
+              <a:ext uri="{FF2B5EF4-FFF2-40B4-BE49-F238E27FC236}">
+                <a16:creationId xmlns:a16="http://schemas.microsoft.com/office/drawing/2014/main" id="{1627EC68-ED1E-CF44-9700-29DDB8674744}"/>
+              </a:ext>
+            </a:extLst>
+          </p:cNvPr>
+          <p:cNvSpPr/>
+          <p:nvPr/>
+        </p:nvSpPr>
+        <p:spPr>
+          <a:xfrm>
+            <a:off x="2040937" y="3976129"/>
+            <a:ext cx="493160" cy="493160"/>
+          </a:xfrm>
+          <a:prstGeom prst="ellipse">
+            <a:avLst/>
+          </a:prstGeom>
+          <a:noFill/>
+          <a:ln>
+            <a:solidFill>
+              <a:schemeClr val="tx1"/>
+            </a:solidFill>
+          </a:ln>
+        </p:spPr>
+        <p:style>
+          <a:lnRef idx="2">
+            <a:schemeClr val="accent1">
+              <a:shade val="50000"/>
+            </a:schemeClr>
+          </a:lnRef>
+          <a:fillRef idx="1">
+            <a:schemeClr val="accent1"/>
+          </a:fillRef>
+          <a:effectRef idx="0">
+            <a:schemeClr val="accent1"/>
+          </a:effectRef>
+          <a:fontRef idx="minor">
+            <a:schemeClr val="lt1"/>
+          </a:fontRef>
+        </p:style>
+        <p:txBody>
+          <a:bodyPr rtlCol="0" anchor="ctr"/>
+          <a:lstStyle/>
+          <a:p>
+            <a:pPr algn="ctr"/>
+            <a:r>
+              <a:rPr lang="en-US" dirty="0">
+                <a:solidFill>
+                  <a:schemeClr val="tx1"/>
+                </a:solidFill>
+              </a:rPr>
+              <a:t>5</a:t>
+            </a:r>
+          </a:p>
+        </p:txBody>
+      </p:sp>
+      <p:sp>
+        <p:nvSpPr>
+          <p:cNvPr id="39" name="Oval 38">
+            <a:extLst>
+              <a:ext uri="{FF2B5EF4-FFF2-40B4-BE49-F238E27FC236}">
+                <a16:creationId xmlns:a16="http://schemas.microsoft.com/office/drawing/2014/main" id="{AD0B9982-444D-3B4B-B14B-998BF829E730}"/>
+              </a:ext>
+            </a:extLst>
+          </p:cNvPr>
+          <p:cNvSpPr/>
+          <p:nvPr/>
+        </p:nvSpPr>
+        <p:spPr>
+          <a:xfrm>
+            <a:off x="1126537" y="4931627"/>
+            <a:ext cx="493160" cy="493160"/>
+          </a:xfrm>
+          <a:prstGeom prst="ellipse">
+            <a:avLst/>
+          </a:prstGeom>
+          <a:noFill/>
+          <a:ln>
+            <a:solidFill>
+              <a:schemeClr val="tx1"/>
+            </a:solidFill>
+          </a:ln>
+        </p:spPr>
+        <p:style>
+          <a:lnRef idx="2">
+            <a:schemeClr val="accent1">
+              <a:shade val="50000"/>
+            </a:schemeClr>
+          </a:lnRef>
+          <a:fillRef idx="1">
+            <a:schemeClr val="accent1"/>
+          </a:fillRef>
+          <a:effectRef idx="0">
+            <a:schemeClr val="accent1"/>
+          </a:effectRef>
+          <a:fontRef idx="minor">
+            <a:schemeClr val="lt1"/>
+          </a:fontRef>
+        </p:style>
+        <p:txBody>
+          <a:bodyPr rtlCol="0" anchor="ctr"/>
+          <a:lstStyle/>
+          <a:p>
+            <a:pPr algn="ctr"/>
+            <a:r>
+              <a:rPr lang="en-US" dirty="0">
+                <a:solidFill>
+                  <a:schemeClr val="tx1"/>
+                </a:solidFill>
+              </a:rPr>
+              <a:t>8</a:t>
+            </a:r>
+          </a:p>
+        </p:txBody>
+      </p:sp>
+      <p:sp>
+        <p:nvSpPr>
+          <p:cNvPr id="40" name="Oval 39">
+            <a:extLst>
+              <a:ext uri="{FF2B5EF4-FFF2-40B4-BE49-F238E27FC236}">
+                <a16:creationId xmlns:a16="http://schemas.microsoft.com/office/drawing/2014/main" id="{6EBF18CB-EF70-7746-82DB-CF95FB5A106A}"/>
+              </a:ext>
+            </a:extLst>
+          </p:cNvPr>
+          <p:cNvSpPr/>
+          <p:nvPr/>
+        </p:nvSpPr>
+        <p:spPr>
+          <a:xfrm>
+            <a:off x="2040937" y="4931627"/>
+            <a:ext cx="493160" cy="493160"/>
+          </a:xfrm>
+          <a:prstGeom prst="ellipse">
+            <a:avLst/>
+          </a:prstGeom>
+          <a:noFill/>
+          <a:ln>
+            <a:solidFill>
+              <a:schemeClr val="tx1"/>
+            </a:solidFill>
+          </a:ln>
+        </p:spPr>
+        <p:style>
+          <a:lnRef idx="2">
+            <a:schemeClr val="accent1">
+              <a:shade val="50000"/>
+            </a:schemeClr>
+          </a:lnRef>
+          <a:fillRef idx="1">
+            <a:schemeClr val="accent1"/>
+          </a:fillRef>
+          <a:effectRef idx="0">
+            <a:schemeClr val="accent1"/>
+          </a:effectRef>
+          <a:fontRef idx="minor">
+            <a:schemeClr val="lt1"/>
+          </a:fontRef>
+        </p:style>
+        <p:txBody>
+          <a:bodyPr rtlCol="0" anchor="ctr"/>
+          <a:lstStyle/>
+          <a:p>
+            <a:pPr algn="ctr"/>
+            <a:r>
+              <a:rPr lang="en-US" dirty="0">
+                <a:solidFill>
+                  <a:schemeClr val="tx1"/>
+                </a:solidFill>
+              </a:rPr>
+              <a:t>9</a:t>
+            </a:r>
+          </a:p>
+        </p:txBody>
+      </p:sp>
+      <p:sp>
+        <p:nvSpPr>
+          <p:cNvPr id="41" name="Oval 40">
+            <a:extLst>
+              <a:ext uri="{FF2B5EF4-FFF2-40B4-BE49-F238E27FC236}">
+                <a16:creationId xmlns:a16="http://schemas.microsoft.com/office/drawing/2014/main" id="{5DD254CB-A2FA-CB4C-B4FB-2E49363FED0D}"/>
+              </a:ext>
+            </a:extLst>
+          </p:cNvPr>
+          <p:cNvSpPr/>
+          <p:nvPr/>
+        </p:nvSpPr>
+        <p:spPr>
+          <a:xfrm>
+            <a:off x="3314933" y="4931627"/>
+            <a:ext cx="493160" cy="493160"/>
+          </a:xfrm>
+          <a:prstGeom prst="ellipse">
+            <a:avLst/>
+          </a:prstGeom>
+          <a:noFill/>
+          <a:ln>
+            <a:solidFill>
+              <a:schemeClr val="tx1"/>
+            </a:solidFill>
+          </a:ln>
+        </p:spPr>
+        <p:style>
+          <a:lnRef idx="2">
+            <a:schemeClr val="accent1">
+              <a:shade val="50000"/>
+            </a:schemeClr>
+          </a:lnRef>
+          <a:fillRef idx="1">
+            <a:schemeClr val="accent1"/>
+          </a:fillRef>
+          <a:effectRef idx="0">
+            <a:schemeClr val="accent1"/>
+          </a:effectRef>
+          <a:fontRef idx="minor">
+            <a:schemeClr val="lt1"/>
+          </a:fontRef>
+        </p:style>
+        <p:txBody>
+          <a:bodyPr rtlCol="0" anchor="ctr"/>
+          <a:lstStyle/>
+          <a:p>
+            <a:pPr algn="ctr"/>
+            <a:r>
+              <a:rPr lang="en-US" sz="1200" dirty="0">
+                <a:solidFill>
+                  <a:schemeClr val="tx1"/>
+                </a:solidFill>
+              </a:rPr>
+              <a:t>10</a:t>
+            </a:r>
+          </a:p>
+        </p:txBody>
+      </p:sp>
+      <p:cxnSp>
+        <p:nvCxnSpPr>
+          <p:cNvPr id="42" name="Straight Arrow Connector 41">
+            <a:extLst>
+              <a:ext uri="{FF2B5EF4-FFF2-40B4-BE49-F238E27FC236}">
+                <a16:creationId xmlns:a16="http://schemas.microsoft.com/office/drawing/2014/main" id="{5D377682-BF0E-3849-9862-A34A9122DE7C}"/>
+              </a:ext>
+            </a:extLst>
+          </p:cNvPr>
+          <p:cNvCxnSpPr>
+            <a:stCxn id="35" idx="4"/>
+            <a:endCxn id="36" idx="0"/>
+          </p:cNvCxnSpPr>
+          <p:nvPr/>
+        </p:nvCxnSpPr>
+        <p:spPr>
+          <a:xfrm>
+            <a:off x="3561514" y="3689311"/>
+            <a:ext cx="0" cy="286818"/>
+          </a:xfrm>
+          <a:prstGeom prst="straightConnector1">
+            <a:avLst/>
+          </a:prstGeom>
+          <a:ln>
+            <a:solidFill>
+              <a:schemeClr val="tx1"/>
+            </a:solidFill>
+            <a:tailEnd type="triangle"/>
+          </a:ln>
+        </p:spPr>
+        <p:style>
+          <a:lnRef idx="1">
+            <a:schemeClr val="accent1"/>
+          </a:lnRef>
+          <a:fillRef idx="0">
+            <a:schemeClr val="accent1"/>
+          </a:fillRef>
+          <a:effectRef idx="0">
+            <a:schemeClr val="accent1"/>
+          </a:effectRef>
+          <a:fontRef idx="minor">
+            <a:schemeClr val="tx1"/>
+          </a:fontRef>
+        </p:style>
+      </p:cxnSp>
+      <p:cxnSp>
+        <p:nvCxnSpPr>
+          <p:cNvPr id="43" name="Straight Arrow Connector 42">
+            <a:extLst>
+              <a:ext uri="{FF2B5EF4-FFF2-40B4-BE49-F238E27FC236}">
+                <a16:creationId xmlns:a16="http://schemas.microsoft.com/office/drawing/2014/main" id="{3C2FC4B9-7A23-2B48-9AFA-D27C49B79225}"/>
+              </a:ext>
+            </a:extLst>
+          </p:cNvPr>
+          <p:cNvCxnSpPr>
+            <a:cxnSpLocks/>
+            <a:stCxn id="36" idx="4"/>
+            <a:endCxn id="41" idx="0"/>
+          </p:cNvCxnSpPr>
+          <p:nvPr/>
+        </p:nvCxnSpPr>
+        <p:spPr>
+          <a:xfrm flipH="1">
+            <a:off x="3561513" y="4469289"/>
+            <a:ext cx="1" cy="462338"/>
+          </a:xfrm>
+          <a:prstGeom prst="straightConnector1">
+            <a:avLst/>
+          </a:prstGeom>
+          <a:ln>
+            <a:solidFill>
+              <a:schemeClr val="tx1"/>
+            </a:solidFill>
+            <a:tailEnd type="triangle"/>
+          </a:ln>
+        </p:spPr>
+        <p:style>
+          <a:lnRef idx="1">
+            <a:schemeClr val="accent1"/>
+          </a:lnRef>
+          <a:fillRef idx="0">
+            <a:schemeClr val="accent1"/>
+          </a:fillRef>
+          <a:effectRef idx="0">
+            <a:schemeClr val="accent1"/>
+          </a:effectRef>
+          <a:fontRef idx="minor">
+            <a:schemeClr val="tx1"/>
+          </a:fontRef>
+        </p:style>
+      </p:cxnSp>
+      <p:cxnSp>
+        <p:nvCxnSpPr>
+          <p:cNvPr id="44" name="Straight Arrow Connector 43">
+            <a:extLst>
+              <a:ext uri="{FF2B5EF4-FFF2-40B4-BE49-F238E27FC236}">
+                <a16:creationId xmlns:a16="http://schemas.microsoft.com/office/drawing/2014/main" id="{36CB5BB8-63CB-514C-A0F1-763A0FB2B74E}"/>
+              </a:ext>
+            </a:extLst>
+          </p:cNvPr>
+          <p:cNvCxnSpPr>
+            <a:cxnSpLocks/>
+            <a:stCxn id="38" idx="4"/>
+            <a:endCxn id="40" idx="0"/>
+          </p:cNvCxnSpPr>
+          <p:nvPr/>
+        </p:nvCxnSpPr>
+        <p:spPr>
+          <a:xfrm>
+            <a:off x="2287517" y="4469289"/>
+            <a:ext cx="0" cy="462338"/>
+          </a:xfrm>
+          <a:prstGeom prst="straightConnector1">
+            <a:avLst/>
+          </a:prstGeom>
+          <a:ln>
+            <a:solidFill>
+              <a:schemeClr val="tx1"/>
+            </a:solidFill>
+            <a:tailEnd type="triangle"/>
+          </a:ln>
+        </p:spPr>
+        <p:style>
+          <a:lnRef idx="1">
+            <a:schemeClr val="accent1"/>
+          </a:lnRef>
+          <a:fillRef idx="0">
+            <a:schemeClr val="accent1"/>
+          </a:fillRef>
+          <a:effectRef idx="0">
+            <a:schemeClr val="accent1"/>
+          </a:effectRef>
+          <a:fontRef idx="minor">
+            <a:schemeClr val="tx1"/>
+          </a:fontRef>
+        </p:style>
+      </p:cxnSp>
+      <p:cxnSp>
+        <p:nvCxnSpPr>
+          <p:cNvPr id="45" name="Straight Arrow Connector 44">
+            <a:extLst>
+              <a:ext uri="{FF2B5EF4-FFF2-40B4-BE49-F238E27FC236}">
+                <a16:creationId xmlns:a16="http://schemas.microsoft.com/office/drawing/2014/main" id="{61162574-D778-C545-93F0-66AAA771A921}"/>
+              </a:ext>
+            </a:extLst>
+          </p:cNvPr>
+          <p:cNvCxnSpPr>
+            <a:cxnSpLocks/>
+            <a:stCxn id="34" idx="4"/>
+            <a:endCxn id="38" idx="0"/>
+          </p:cNvCxnSpPr>
+          <p:nvPr/>
+        </p:nvCxnSpPr>
+        <p:spPr>
+          <a:xfrm>
+            <a:off x="1866277" y="3689311"/>
+            <a:ext cx="421240" cy="286818"/>
+          </a:xfrm>
+          <a:prstGeom prst="straightConnector1">
+            <a:avLst/>
+          </a:prstGeom>
+          <a:ln>
+            <a:solidFill>
+              <a:schemeClr val="tx1"/>
+            </a:solidFill>
+            <a:tailEnd type="triangle"/>
+          </a:ln>
+        </p:spPr>
+        <p:style>
+          <a:lnRef idx="1">
+            <a:schemeClr val="accent1"/>
+          </a:lnRef>
+          <a:fillRef idx="0">
+            <a:schemeClr val="accent1"/>
+          </a:fillRef>
+          <a:effectRef idx="0">
+            <a:schemeClr val="accent1"/>
+          </a:effectRef>
+          <a:fontRef idx="minor">
+            <a:schemeClr val="tx1"/>
+          </a:fontRef>
+        </p:style>
+      </p:cxnSp>
+      <p:cxnSp>
+        <p:nvCxnSpPr>
+          <p:cNvPr id="46" name="Straight Arrow Connector 45">
+            <a:extLst>
+              <a:ext uri="{FF2B5EF4-FFF2-40B4-BE49-F238E27FC236}">
+                <a16:creationId xmlns:a16="http://schemas.microsoft.com/office/drawing/2014/main" id="{1FCBC232-D0C0-6B42-97BB-515250AE6138}"/>
+              </a:ext>
+            </a:extLst>
+          </p:cNvPr>
+          <p:cNvCxnSpPr>
+            <a:cxnSpLocks/>
+            <a:stCxn id="34" idx="4"/>
+            <a:endCxn id="37" idx="0"/>
+          </p:cNvCxnSpPr>
+          <p:nvPr/>
+        </p:nvCxnSpPr>
+        <p:spPr>
+          <a:xfrm flipH="1">
+            <a:off x="1373117" y="3689311"/>
+            <a:ext cx="493160" cy="286818"/>
+          </a:xfrm>
+          <a:prstGeom prst="straightConnector1">
+            <a:avLst/>
+          </a:prstGeom>
+          <a:ln>
+            <a:solidFill>
+              <a:schemeClr val="tx1"/>
+            </a:solidFill>
+            <a:tailEnd type="triangle"/>
+          </a:ln>
+        </p:spPr>
+        <p:style>
+          <a:lnRef idx="1">
+            <a:schemeClr val="accent1"/>
+          </a:lnRef>
+          <a:fillRef idx="0">
+            <a:schemeClr val="accent1"/>
+          </a:fillRef>
+          <a:effectRef idx="0">
+            <a:schemeClr val="accent1"/>
+          </a:effectRef>
+          <a:fontRef idx="minor">
+            <a:schemeClr val="tx1"/>
+          </a:fontRef>
+        </p:style>
+      </p:cxnSp>
+      <p:cxnSp>
+        <p:nvCxnSpPr>
+          <p:cNvPr id="47" name="Straight Arrow Connector 46">
+            <a:extLst>
+              <a:ext uri="{FF2B5EF4-FFF2-40B4-BE49-F238E27FC236}">
+                <a16:creationId xmlns:a16="http://schemas.microsoft.com/office/drawing/2014/main" id="{A1415F2B-99FF-AC4C-AEE7-D0CEBF63F70F}"/>
+              </a:ext>
+            </a:extLst>
+          </p:cNvPr>
+          <p:cNvCxnSpPr>
+            <a:cxnSpLocks/>
+            <a:stCxn id="37" idx="4"/>
+            <a:endCxn id="39" idx="0"/>
+          </p:cNvCxnSpPr>
+          <p:nvPr/>
+        </p:nvCxnSpPr>
+        <p:spPr>
+          <a:xfrm>
+            <a:off x="1373117" y="4469289"/>
+            <a:ext cx="0" cy="462338"/>
+          </a:xfrm>
+          <a:prstGeom prst="straightConnector1">
+            <a:avLst/>
+          </a:prstGeom>
+          <a:ln>
+            <a:solidFill>
+              <a:schemeClr val="tx1"/>
+            </a:solidFill>
+            <a:tailEnd type="triangle"/>
+          </a:ln>
+        </p:spPr>
+        <p:style>
+          <a:lnRef idx="1">
+            <a:schemeClr val="accent1"/>
+          </a:lnRef>
+          <a:fillRef idx="0">
+            <a:schemeClr val="accent1"/>
+          </a:fillRef>
+          <a:effectRef idx="0">
+            <a:schemeClr val="accent1"/>
+          </a:effectRef>
+          <a:fontRef idx="minor">
+            <a:schemeClr val="tx1"/>
+          </a:fontRef>
+        </p:style>
+      </p:cxnSp>
+      <p:cxnSp>
+        <p:nvCxnSpPr>
+          <p:cNvPr id="48" name="Straight Arrow Connector 47">
+            <a:extLst>
+              <a:ext uri="{FF2B5EF4-FFF2-40B4-BE49-F238E27FC236}">
+                <a16:creationId xmlns:a16="http://schemas.microsoft.com/office/drawing/2014/main" id="{0F112471-FB24-EC40-9576-2C9D7CBBA525}"/>
+              </a:ext>
+            </a:extLst>
+          </p:cNvPr>
+          <p:cNvCxnSpPr>
+            <a:cxnSpLocks/>
+            <a:stCxn id="32" idx="4"/>
+            <a:endCxn id="33" idx="0"/>
+          </p:cNvCxnSpPr>
+          <p:nvPr/>
+        </p:nvCxnSpPr>
+        <p:spPr>
+          <a:xfrm>
+            <a:off x="2780677" y="1975238"/>
+            <a:ext cx="0" cy="265415"/>
+          </a:xfrm>
+          <a:prstGeom prst="straightConnector1">
+            <a:avLst/>
+          </a:prstGeom>
+          <a:ln>
+            <a:solidFill>
+              <a:schemeClr val="tx1"/>
+            </a:solidFill>
+            <a:tailEnd type="triangle"/>
+          </a:ln>
+        </p:spPr>
+        <p:style>
+          <a:lnRef idx="1">
+            <a:schemeClr val="accent1"/>
+          </a:lnRef>
+          <a:fillRef idx="0">
+            <a:schemeClr val="accent1"/>
+          </a:fillRef>
+          <a:effectRef idx="0">
+            <a:schemeClr val="accent1"/>
+          </a:effectRef>
+          <a:fontRef idx="minor">
+            <a:schemeClr val="tx1"/>
+          </a:fontRef>
+        </p:style>
+      </p:cxnSp>
+      <p:cxnSp>
+        <p:nvCxnSpPr>
+          <p:cNvPr id="49" name="Straight Arrow Connector 48">
+            <a:extLst>
+              <a:ext uri="{FF2B5EF4-FFF2-40B4-BE49-F238E27FC236}">
+                <a16:creationId xmlns:a16="http://schemas.microsoft.com/office/drawing/2014/main" id="{0A9DFB7D-5BD8-D34E-8E6F-DEF553AA9D5B}"/>
+              </a:ext>
+            </a:extLst>
+          </p:cNvPr>
+          <p:cNvCxnSpPr>
+            <a:cxnSpLocks/>
+            <a:stCxn id="33" idx="4"/>
+            <a:endCxn id="35" idx="0"/>
+          </p:cNvCxnSpPr>
+          <p:nvPr/>
+        </p:nvCxnSpPr>
+        <p:spPr>
+          <a:xfrm>
+            <a:off x="2780677" y="2733813"/>
+            <a:ext cx="780837" cy="462338"/>
+          </a:xfrm>
+          <a:prstGeom prst="straightConnector1">
+            <a:avLst/>
+          </a:prstGeom>
+          <a:ln>
+            <a:solidFill>
+              <a:schemeClr val="tx1"/>
+            </a:solidFill>
+            <a:tailEnd type="triangle"/>
+          </a:ln>
+        </p:spPr>
+        <p:style>
+          <a:lnRef idx="1">
+            <a:schemeClr val="accent1"/>
+          </a:lnRef>
+          <a:fillRef idx="0">
+            <a:schemeClr val="accent1"/>
+          </a:fillRef>
+          <a:effectRef idx="0">
+            <a:schemeClr val="accent1"/>
+          </a:effectRef>
+          <a:fontRef idx="minor">
+            <a:schemeClr val="tx1"/>
+          </a:fontRef>
+        </p:style>
+      </p:cxnSp>
+      <p:cxnSp>
+        <p:nvCxnSpPr>
+          <p:cNvPr id="50" name="Straight Arrow Connector 49">
+            <a:extLst>
+              <a:ext uri="{FF2B5EF4-FFF2-40B4-BE49-F238E27FC236}">
+                <a16:creationId xmlns:a16="http://schemas.microsoft.com/office/drawing/2014/main" id="{1C8084B2-183F-5F4D-B95A-76E865E64857}"/>
+              </a:ext>
+            </a:extLst>
+          </p:cNvPr>
+          <p:cNvCxnSpPr>
+            <a:cxnSpLocks/>
+            <a:stCxn id="33" idx="4"/>
+            <a:endCxn id="34" idx="0"/>
+          </p:cNvCxnSpPr>
+          <p:nvPr/>
+        </p:nvCxnSpPr>
+        <p:spPr>
+          <a:xfrm flipH="1">
+            <a:off x="1866277" y="2733813"/>
+            <a:ext cx="914400" cy="462338"/>
+          </a:xfrm>
+          <a:prstGeom prst="straightConnector1">
+            <a:avLst/>
+          </a:prstGeom>
+          <a:ln>
+            <a:solidFill>
+              <a:schemeClr val="tx1"/>
+            </a:solidFill>
+            <a:tailEnd type="triangle"/>
+          </a:ln>
+        </p:spPr>
+        <p:style>
+          <a:lnRef idx="1">
+            <a:schemeClr val="accent1"/>
+          </a:lnRef>
+          <a:fillRef idx="0">
+            <a:schemeClr val="accent1"/>
+          </a:fillRef>
+          <a:effectRef idx="0">
+            <a:schemeClr val="accent1"/>
+          </a:effectRef>
+          <a:fontRef idx="minor">
+            <a:schemeClr val="tx1"/>
+          </a:fontRef>
+        </p:style>
+      </p:cxnSp>
+      <p:cxnSp>
+        <p:nvCxnSpPr>
+          <p:cNvPr id="51" name="Straight Connector 50">
+            <a:extLst>
+              <a:ext uri="{FF2B5EF4-FFF2-40B4-BE49-F238E27FC236}">
+                <a16:creationId xmlns:a16="http://schemas.microsoft.com/office/drawing/2014/main" id="{308E64B6-552E-4F49-8D5E-9EFF019542EB}"/>
+              </a:ext>
+            </a:extLst>
+          </p:cNvPr>
+          <p:cNvCxnSpPr>
+            <a:cxnSpLocks/>
+          </p:cNvCxnSpPr>
+          <p:nvPr/>
+        </p:nvCxnSpPr>
+        <p:spPr>
+          <a:xfrm>
+            <a:off x="766944" y="2910187"/>
+            <a:ext cx="3493213" cy="0"/>
+          </a:xfrm>
+          <a:prstGeom prst="line">
+            <a:avLst/>
+          </a:prstGeom>
+          <a:ln>
+            <a:prstDash val="dash"/>
+          </a:ln>
+        </p:spPr>
+        <p:style>
+          <a:lnRef idx="1">
+            <a:schemeClr val="accent1"/>
+          </a:lnRef>
+          <a:fillRef idx="0">
+            <a:schemeClr val="accent1"/>
+          </a:fillRef>
+          <a:effectRef idx="0">
+            <a:schemeClr val="accent1"/>
+          </a:effectRef>
+          <a:fontRef idx="minor">
+            <a:schemeClr val="tx1"/>
+          </a:fontRef>
+        </p:style>
+      </p:cxnSp>
+      <p:cxnSp>
+        <p:nvCxnSpPr>
+          <p:cNvPr id="52" name="Straight Connector 51">
+            <a:extLst>
+              <a:ext uri="{FF2B5EF4-FFF2-40B4-BE49-F238E27FC236}">
+                <a16:creationId xmlns:a16="http://schemas.microsoft.com/office/drawing/2014/main" id="{B29E0569-1325-C24A-ACAB-15E36E2068E7}"/>
+              </a:ext>
+            </a:extLst>
+          </p:cNvPr>
+          <p:cNvCxnSpPr>
+            <a:cxnSpLocks/>
+          </p:cNvCxnSpPr>
+          <p:nvPr/>
+        </p:nvCxnSpPr>
+        <p:spPr>
+          <a:xfrm>
+            <a:off x="766944" y="4644808"/>
+            <a:ext cx="3493213" cy="0"/>
+          </a:xfrm>
+          <a:prstGeom prst="line">
+            <a:avLst/>
+          </a:prstGeom>
+          <a:ln>
+            <a:prstDash val="dash"/>
+          </a:ln>
+        </p:spPr>
+        <p:style>
+          <a:lnRef idx="1">
+            <a:schemeClr val="accent1"/>
+          </a:lnRef>
+          <a:fillRef idx="0">
+            <a:schemeClr val="accent1"/>
+          </a:fillRef>
+          <a:effectRef idx="0">
+            <a:schemeClr val="accent1"/>
+          </a:effectRef>
+          <a:fontRef idx="minor">
+            <a:schemeClr val="tx1"/>
+          </a:fontRef>
+        </p:style>
+      </p:cxnSp>
+      <p:cxnSp>
+        <p:nvCxnSpPr>
+          <p:cNvPr id="53" name="Straight Connector 52">
+            <a:extLst>
+              <a:ext uri="{FF2B5EF4-FFF2-40B4-BE49-F238E27FC236}">
+                <a16:creationId xmlns:a16="http://schemas.microsoft.com/office/drawing/2014/main" id="{884AE8EE-98E1-724A-ABE8-F9638D8EDC7D}"/>
+              </a:ext>
+            </a:extLst>
+          </p:cNvPr>
+          <p:cNvCxnSpPr>
+            <a:cxnSpLocks/>
+          </p:cNvCxnSpPr>
+          <p:nvPr/>
+        </p:nvCxnSpPr>
+        <p:spPr>
+          <a:xfrm>
+            <a:off x="2780677" y="2910187"/>
+            <a:ext cx="0" cy="2671281"/>
+          </a:xfrm>
+          <a:prstGeom prst="line">
+            <a:avLst/>
+          </a:prstGeom>
+          <a:ln>
+            <a:prstDash val="dash"/>
+          </a:ln>
+        </p:spPr>
+        <p:style>
+          <a:lnRef idx="1">
+            <a:schemeClr val="accent1"/>
+          </a:lnRef>
+          <a:fillRef idx="0">
+            <a:schemeClr val="accent1"/>
+          </a:fillRef>
+          <a:effectRef idx="0">
+            <a:schemeClr val="accent1"/>
+          </a:effectRef>
+          <a:fontRef idx="minor">
+            <a:schemeClr val="tx1"/>
+          </a:fontRef>
+        </p:style>
+      </p:cxnSp>
+      <p:cxnSp>
+        <p:nvCxnSpPr>
+          <p:cNvPr id="54" name="Straight Connector 53">
+            <a:extLst>
+              <a:ext uri="{FF2B5EF4-FFF2-40B4-BE49-F238E27FC236}">
+                <a16:creationId xmlns:a16="http://schemas.microsoft.com/office/drawing/2014/main" id="{A42AFFCF-1C30-1F45-8D19-65070470867B}"/>
+              </a:ext>
+            </a:extLst>
+          </p:cNvPr>
+          <p:cNvCxnSpPr>
+            <a:cxnSpLocks/>
+          </p:cNvCxnSpPr>
+          <p:nvPr/>
+        </p:nvCxnSpPr>
+        <p:spPr>
+          <a:xfrm>
+            <a:off x="1792648" y="4667926"/>
+            <a:ext cx="0" cy="913542"/>
+          </a:xfrm>
+          <a:prstGeom prst="line">
+            <a:avLst/>
+          </a:prstGeom>
+          <a:ln>
+            <a:prstDash val="dash"/>
+          </a:ln>
+        </p:spPr>
+        <p:style>
+          <a:lnRef idx="1">
+            <a:schemeClr val="accent1"/>
+          </a:lnRef>
+          <a:fillRef idx="0">
+            <a:schemeClr val="accent1"/>
+          </a:fillRef>
+          <a:effectRef idx="0">
+            <a:schemeClr val="accent1"/>
+          </a:effectRef>
+          <a:fontRef idx="minor">
+            <a:schemeClr val="tx1"/>
+          </a:fontRef>
+        </p:style>
+      </p:cxnSp>
+      <p:sp>
+        <p:nvSpPr>
+          <p:cNvPr id="55" name="TextBox 54">
+            <a:extLst>
+              <a:ext uri="{FF2B5EF4-FFF2-40B4-BE49-F238E27FC236}">
+                <a16:creationId xmlns:a16="http://schemas.microsoft.com/office/drawing/2014/main" id="{E1876040-B571-CB4F-B928-09755D90573D}"/>
+              </a:ext>
+            </a:extLst>
+          </p:cNvPr>
+          <p:cNvSpPr txBox="1"/>
+          <p:nvPr/>
+        </p:nvSpPr>
+        <p:spPr>
+          <a:xfrm>
+            <a:off x="766944" y="1482077"/>
+            <a:ext cx="976549" cy="338554"/>
+          </a:xfrm>
+          <a:prstGeom prst="rect">
+            <a:avLst/>
+          </a:prstGeom>
+          <a:noFill/>
+        </p:spPr>
+        <p:txBody>
+          <a:bodyPr wrap="none" rtlCol="0">
+            <a:spAutoFit/>
+          </a:bodyPr>
+          <a:lstStyle/>
+          <a:p>
+            <a:r>
+              <a:rPr lang="en-US" sz="1600" dirty="0">
+                <a:solidFill>
+                  <a:schemeClr val="accent1"/>
+                </a:solidFill>
+              </a:rPr>
+              <a:t>S1, S2, S3</a:t>
+            </a:r>
+          </a:p>
+        </p:txBody>
+      </p:sp>
+      <p:sp>
+        <p:nvSpPr>
+          <p:cNvPr id="56" name="TextBox 55">
+            <a:extLst>
+              <a:ext uri="{FF2B5EF4-FFF2-40B4-BE49-F238E27FC236}">
+                <a16:creationId xmlns:a16="http://schemas.microsoft.com/office/drawing/2014/main" id="{15863EAA-7E04-8247-95D5-CD5DAB016B68}"/>
+              </a:ext>
+            </a:extLst>
+          </p:cNvPr>
+          <p:cNvSpPr txBox="1"/>
+          <p:nvPr/>
+        </p:nvSpPr>
+        <p:spPr>
+          <a:xfrm>
+            <a:off x="722996" y="2987064"/>
+            <a:ext cx="679994" cy="338554"/>
+          </a:xfrm>
+          <a:prstGeom prst="rect">
+            <a:avLst/>
+          </a:prstGeom>
+          <a:noFill/>
+        </p:spPr>
+        <p:txBody>
+          <a:bodyPr wrap="none" rtlCol="0">
+            <a:spAutoFit/>
+          </a:bodyPr>
+          <a:lstStyle/>
+          <a:p>
+            <a:r>
+              <a:rPr lang="en-US" sz="1600" dirty="0">
+                <a:solidFill>
+                  <a:schemeClr val="accent1"/>
+                </a:solidFill>
+              </a:rPr>
+              <a:t>S1, S3</a:t>
+            </a:r>
+          </a:p>
+        </p:txBody>
+      </p:sp>
+      <p:sp>
+        <p:nvSpPr>
+          <p:cNvPr id="57" name="TextBox 56">
+            <a:extLst>
+              <a:ext uri="{FF2B5EF4-FFF2-40B4-BE49-F238E27FC236}">
+                <a16:creationId xmlns:a16="http://schemas.microsoft.com/office/drawing/2014/main" id="{5A11814A-5D21-9E40-9CCE-2C7B10863B93}"/>
+              </a:ext>
+            </a:extLst>
+          </p:cNvPr>
+          <p:cNvSpPr txBox="1"/>
+          <p:nvPr/>
+        </p:nvSpPr>
+        <p:spPr>
+          <a:xfrm>
+            <a:off x="3854075" y="2987064"/>
+            <a:ext cx="679994" cy="338554"/>
+          </a:xfrm>
+          <a:prstGeom prst="rect">
+            <a:avLst/>
+          </a:prstGeom>
+          <a:noFill/>
+        </p:spPr>
+        <p:txBody>
+          <a:bodyPr wrap="none" rtlCol="0">
+            <a:spAutoFit/>
+          </a:bodyPr>
+          <a:lstStyle/>
+          <a:p>
+            <a:r>
+              <a:rPr lang="en-US" sz="1600" dirty="0">
+                <a:solidFill>
+                  <a:schemeClr val="accent1"/>
+                </a:solidFill>
+              </a:rPr>
+              <a:t>S1, S2</a:t>
+            </a:r>
+          </a:p>
+        </p:txBody>
+      </p:sp>
+      <p:sp>
+        <p:nvSpPr>
+          <p:cNvPr id="58" name="TextBox 57">
+            <a:extLst>
+              <a:ext uri="{FF2B5EF4-FFF2-40B4-BE49-F238E27FC236}">
+                <a16:creationId xmlns:a16="http://schemas.microsoft.com/office/drawing/2014/main" id="{5E3ECC3F-01D2-0945-AE28-9517F5139D57}"/>
+              </a:ext>
+            </a:extLst>
+          </p:cNvPr>
+          <p:cNvSpPr txBox="1"/>
+          <p:nvPr/>
+        </p:nvSpPr>
+        <p:spPr>
+          <a:xfrm>
+            <a:off x="723477" y="4658015"/>
+            <a:ext cx="383438" cy="338554"/>
+          </a:xfrm>
+          <a:prstGeom prst="rect">
+            <a:avLst/>
+          </a:prstGeom>
+          <a:noFill/>
+        </p:spPr>
+        <p:txBody>
+          <a:bodyPr wrap="none" rtlCol="0">
+            <a:spAutoFit/>
+          </a:bodyPr>
+          <a:lstStyle/>
+          <a:p>
+            <a:r>
+              <a:rPr lang="en-US" sz="1600" dirty="0">
+                <a:solidFill>
+                  <a:schemeClr val="accent1"/>
+                </a:solidFill>
+              </a:rPr>
+              <a:t>S1</a:t>
+            </a:r>
+          </a:p>
+        </p:txBody>
+      </p:sp>
+      <p:sp>
+        <p:nvSpPr>
+          <p:cNvPr id="59" name="TextBox 58">
+            <a:extLst>
+              <a:ext uri="{FF2B5EF4-FFF2-40B4-BE49-F238E27FC236}">
+                <a16:creationId xmlns:a16="http://schemas.microsoft.com/office/drawing/2014/main" id="{D4785CD1-861B-3B41-A6B8-D9BB6F7EA423}"/>
+              </a:ext>
+            </a:extLst>
+          </p:cNvPr>
+          <p:cNvSpPr txBox="1"/>
+          <p:nvPr/>
+        </p:nvSpPr>
+        <p:spPr>
+          <a:xfrm>
+            <a:off x="1819516" y="4667926"/>
+            <a:ext cx="383438" cy="338554"/>
+          </a:xfrm>
+          <a:prstGeom prst="rect">
+            <a:avLst/>
+          </a:prstGeom>
+          <a:noFill/>
+        </p:spPr>
+        <p:txBody>
+          <a:bodyPr wrap="none" rtlCol="0">
+            <a:spAutoFit/>
+          </a:bodyPr>
+          <a:lstStyle/>
+          <a:p>
+            <a:r>
+              <a:rPr lang="en-US" sz="1600" dirty="0">
+                <a:solidFill>
+                  <a:schemeClr val="accent1"/>
+                </a:solidFill>
+              </a:rPr>
+              <a:t>S2</a:t>
+            </a:r>
+          </a:p>
+        </p:txBody>
+      </p:sp>
+      <p:sp>
+        <p:nvSpPr>
+          <p:cNvPr id="60" name="TextBox 59">
+            <a:extLst>
+              <a:ext uri="{FF2B5EF4-FFF2-40B4-BE49-F238E27FC236}">
+                <a16:creationId xmlns:a16="http://schemas.microsoft.com/office/drawing/2014/main" id="{BB0F0D35-AF1C-0341-AE38-7C0900D897DB}"/>
+              </a:ext>
+            </a:extLst>
+          </p:cNvPr>
+          <p:cNvSpPr txBox="1"/>
+          <p:nvPr/>
+        </p:nvSpPr>
+        <p:spPr>
+          <a:xfrm>
+            <a:off x="2826186" y="4656183"/>
+            <a:ext cx="383438" cy="338554"/>
+          </a:xfrm>
+          <a:prstGeom prst="rect">
+            <a:avLst/>
+          </a:prstGeom>
+          <a:noFill/>
+        </p:spPr>
+        <p:txBody>
+          <a:bodyPr wrap="none" rtlCol="0">
+            <a:spAutoFit/>
+          </a:bodyPr>
+          <a:lstStyle/>
+          <a:p>
+            <a:r>
+              <a:rPr lang="en-US" sz="1600" dirty="0">
+                <a:solidFill>
+                  <a:schemeClr val="accent1"/>
+                </a:solidFill>
+              </a:rPr>
+              <a:t>S3</a:t>
+            </a:r>
+          </a:p>
+        </p:txBody>
+      </p:sp>
+      <p:sp>
+        <p:nvSpPr>
+          <p:cNvPr id="61" name="Title 60">
+            <a:extLst>
+              <a:ext uri="{FF2B5EF4-FFF2-40B4-BE49-F238E27FC236}">
+                <a16:creationId xmlns:a16="http://schemas.microsoft.com/office/drawing/2014/main" id="{DADF2D13-A876-6641-BA55-9D7873F9FACF}"/>
+              </a:ext>
+            </a:extLst>
+          </p:cNvPr>
+          <p:cNvSpPr>
+            <a:spLocks noGrp="1"/>
+          </p:cNvSpPr>
+          <p:nvPr>
+            <p:ph type="title"/>
+          </p:nvPr>
+        </p:nvSpPr>
+        <p:spPr>
+          <a:xfrm>
+            <a:off x="722996" y="365125"/>
+            <a:ext cx="10630804" cy="357173"/>
+          </a:xfrm>
+        </p:spPr>
+        <p:txBody>
+          <a:bodyPr>
+            <a:noAutofit/>
+          </a:bodyPr>
+          <a:lstStyle/>
+          <a:p>
+            <a:r>
+              <a:rPr lang="en-US" sz="2400" dirty="0"/>
+              <a:t>Clustering first – not great at discriminating clusters within a box</a:t>
+            </a:r>
+          </a:p>
+        </p:txBody>
+      </p:sp>
+      <p:sp>
+        <p:nvSpPr>
+          <p:cNvPr id="62" name="TextBox 61">
+            <a:extLst>
+              <a:ext uri="{FF2B5EF4-FFF2-40B4-BE49-F238E27FC236}">
+                <a16:creationId xmlns:a16="http://schemas.microsoft.com/office/drawing/2014/main" id="{8E8E8D28-B622-E745-906E-881818BCD69E}"/>
+              </a:ext>
+            </a:extLst>
+          </p:cNvPr>
+          <p:cNvSpPr txBox="1"/>
+          <p:nvPr/>
+        </p:nvSpPr>
+        <p:spPr>
+          <a:xfrm>
+            <a:off x="5822334" y="6152409"/>
+            <a:ext cx="4736040" cy="369332"/>
+          </a:xfrm>
+          <a:prstGeom prst="rect">
+            <a:avLst/>
+          </a:prstGeom>
+          <a:noFill/>
+        </p:spPr>
+        <p:txBody>
+          <a:bodyPr wrap="none" rtlCol="0">
+            <a:spAutoFit/>
+          </a:bodyPr>
+          <a:lstStyle/>
+          <a:p>
+            <a:r>
+              <a:rPr lang="en-US" dirty="0"/>
+              <a:t>Simulated data: 100 variants total, 10 per cluster</a:t>
+            </a:r>
+          </a:p>
+        </p:txBody>
+      </p:sp>
+    </p:spTree>
+    <p:extLst>
+      <p:ext uri="{BB962C8B-B14F-4D97-AF65-F5344CB8AC3E}">
+        <p14:creationId xmlns:p14="http://schemas.microsoft.com/office/powerpoint/2010/main" val="3727010213"/>
       </p:ext>
     </p:extLst>
   </p:cSld>

</xml_diff>

<commit_message>
visualize proportions on z plot
</commit_message>
<xml_diff>
--- a/v6/figs/test-data-1.pptx
+++ b/v6/figs/test-data-1.pptx
@@ -260,7 +260,7 @@
           <a:p>
             <a:fld id="{61B16F4C-C331-6548-96FB-81D0C6C1BA52}" type="datetimeFigureOut">
               <a:rPr lang="en-US" smtClean="0"/>
-              <a:t>1/15/20</a:t>
+              <a:t>1/20/20</a:t>
             </a:fld>
             <a:endParaRPr lang="en-US"/>
           </a:p>
@@ -458,7 +458,7 @@
           <a:p>
             <a:fld id="{61B16F4C-C331-6548-96FB-81D0C6C1BA52}" type="datetimeFigureOut">
               <a:rPr lang="en-US" smtClean="0"/>
-              <a:t>1/15/20</a:t>
+              <a:t>1/20/20</a:t>
             </a:fld>
             <a:endParaRPr lang="en-US"/>
           </a:p>
@@ -666,7 +666,7 @@
           <a:p>
             <a:fld id="{61B16F4C-C331-6548-96FB-81D0C6C1BA52}" type="datetimeFigureOut">
               <a:rPr lang="en-US" smtClean="0"/>
-              <a:t>1/15/20</a:t>
+              <a:t>1/20/20</a:t>
             </a:fld>
             <a:endParaRPr lang="en-US"/>
           </a:p>
@@ -864,7 +864,7 @@
           <a:p>
             <a:fld id="{61B16F4C-C331-6548-96FB-81D0C6C1BA52}" type="datetimeFigureOut">
               <a:rPr lang="en-US" smtClean="0"/>
-              <a:t>1/15/20</a:t>
+              <a:t>1/20/20</a:t>
             </a:fld>
             <a:endParaRPr lang="en-US"/>
           </a:p>
@@ -1139,7 +1139,7 @@
           <a:p>
             <a:fld id="{61B16F4C-C331-6548-96FB-81D0C6C1BA52}" type="datetimeFigureOut">
               <a:rPr lang="en-US" smtClean="0"/>
-              <a:t>1/15/20</a:t>
+              <a:t>1/20/20</a:t>
             </a:fld>
             <a:endParaRPr lang="en-US"/>
           </a:p>
@@ -1404,7 +1404,7 @@
           <a:p>
             <a:fld id="{61B16F4C-C331-6548-96FB-81D0C6C1BA52}" type="datetimeFigureOut">
               <a:rPr lang="en-US" smtClean="0"/>
-              <a:t>1/15/20</a:t>
+              <a:t>1/20/20</a:t>
             </a:fld>
             <a:endParaRPr lang="en-US"/>
           </a:p>
@@ -1816,7 +1816,7 @@
           <a:p>
             <a:fld id="{61B16F4C-C331-6548-96FB-81D0C6C1BA52}" type="datetimeFigureOut">
               <a:rPr lang="en-US" smtClean="0"/>
-              <a:t>1/15/20</a:t>
+              <a:t>1/20/20</a:t>
             </a:fld>
             <a:endParaRPr lang="en-US"/>
           </a:p>
@@ -1957,7 +1957,7 @@
           <a:p>
             <a:fld id="{61B16F4C-C331-6548-96FB-81D0C6C1BA52}" type="datetimeFigureOut">
               <a:rPr lang="en-US" smtClean="0"/>
-              <a:t>1/15/20</a:t>
+              <a:t>1/20/20</a:t>
             </a:fld>
             <a:endParaRPr lang="en-US"/>
           </a:p>
@@ -2070,7 +2070,7 @@
           <a:p>
             <a:fld id="{61B16F4C-C331-6548-96FB-81D0C6C1BA52}" type="datetimeFigureOut">
               <a:rPr lang="en-US" smtClean="0"/>
-              <a:t>1/15/20</a:t>
+              <a:t>1/20/20</a:t>
             </a:fld>
             <a:endParaRPr lang="en-US"/>
           </a:p>
@@ -2381,7 +2381,7 @@
           <a:p>
             <a:fld id="{61B16F4C-C331-6548-96FB-81D0C6C1BA52}" type="datetimeFigureOut">
               <a:rPr lang="en-US" smtClean="0"/>
-              <a:t>1/15/20</a:t>
+              <a:t>1/20/20</a:t>
             </a:fld>
             <a:endParaRPr lang="en-US"/>
           </a:p>
@@ -2669,7 +2669,7 @@
           <a:p>
             <a:fld id="{61B16F4C-C331-6548-96FB-81D0C6C1BA52}" type="datetimeFigureOut">
               <a:rPr lang="en-US" smtClean="0"/>
-              <a:t>1/15/20</a:t>
+              <a:t>1/20/20</a:t>
             </a:fld>
             <a:endParaRPr lang="en-US"/>
           </a:p>
@@ -2910,7 +2910,7 @@
           <a:p>
             <a:fld id="{61B16F4C-C331-6548-96FB-81D0C6C1BA52}" type="datetimeFigureOut">
               <a:rPr lang="en-US" smtClean="0"/>
-              <a:t>1/15/20</a:t>
+              <a:t>1/20/20</a:t>
             </a:fld>
             <a:endParaRPr lang="en-US"/>
           </a:p>
@@ -5647,12 +5647,1485 @@
           <a:chExt cx="0" cy="0"/>
         </a:xfrm>
       </p:grpSpPr>
+      <p:sp>
+        <p:nvSpPr>
+          <p:cNvPr id="32" name="Oval 31">
+            <a:extLst>
+              <a:ext uri="{FF2B5EF4-FFF2-40B4-BE49-F238E27FC236}">
+                <a16:creationId xmlns:a16="http://schemas.microsoft.com/office/drawing/2014/main" id="{76AAB362-BB57-964F-BE7E-DCC3214D8B9E}"/>
+              </a:ext>
+            </a:extLst>
+          </p:cNvPr>
+          <p:cNvSpPr/>
+          <p:nvPr/>
+        </p:nvSpPr>
+        <p:spPr>
+          <a:xfrm>
+            <a:off x="2534097" y="1482078"/>
+            <a:ext cx="493160" cy="493160"/>
+          </a:xfrm>
+          <a:prstGeom prst="ellipse">
+            <a:avLst/>
+          </a:prstGeom>
+          <a:noFill/>
+          <a:ln>
+            <a:solidFill>
+              <a:schemeClr val="tx1"/>
+            </a:solidFill>
+          </a:ln>
+        </p:spPr>
+        <p:style>
+          <a:lnRef idx="2">
+            <a:schemeClr val="accent1">
+              <a:shade val="50000"/>
+            </a:schemeClr>
+          </a:lnRef>
+          <a:fillRef idx="1">
+            <a:schemeClr val="accent1"/>
+          </a:fillRef>
+          <a:effectRef idx="0">
+            <a:schemeClr val="accent1"/>
+          </a:effectRef>
+          <a:fontRef idx="minor">
+            <a:schemeClr val="lt1"/>
+          </a:fontRef>
+        </p:style>
+        <p:txBody>
+          <a:bodyPr rtlCol="0" anchor="ctr"/>
+          <a:lstStyle/>
+          <a:p>
+            <a:pPr algn="ctr"/>
+            <a:r>
+              <a:rPr lang="en-US" dirty="0">
+                <a:solidFill>
+                  <a:schemeClr val="tx1"/>
+                </a:solidFill>
+              </a:rPr>
+              <a:t>1</a:t>
+            </a:r>
+          </a:p>
+        </p:txBody>
+      </p:sp>
+      <p:sp>
+        <p:nvSpPr>
+          <p:cNvPr id="33" name="Oval 32">
+            <a:extLst>
+              <a:ext uri="{FF2B5EF4-FFF2-40B4-BE49-F238E27FC236}">
+                <a16:creationId xmlns:a16="http://schemas.microsoft.com/office/drawing/2014/main" id="{7655B9DE-335F-D34C-BDD6-3F5EB1ECCABC}"/>
+              </a:ext>
+            </a:extLst>
+          </p:cNvPr>
+          <p:cNvSpPr/>
+          <p:nvPr/>
+        </p:nvSpPr>
+        <p:spPr>
+          <a:xfrm>
+            <a:off x="2534097" y="2240653"/>
+            <a:ext cx="493160" cy="493160"/>
+          </a:xfrm>
+          <a:prstGeom prst="ellipse">
+            <a:avLst/>
+          </a:prstGeom>
+          <a:noFill/>
+          <a:ln>
+            <a:solidFill>
+              <a:schemeClr val="tx1"/>
+            </a:solidFill>
+          </a:ln>
+        </p:spPr>
+        <p:style>
+          <a:lnRef idx="2">
+            <a:schemeClr val="accent1">
+              <a:shade val="50000"/>
+            </a:schemeClr>
+          </a:lnRef>
+          <a:fillRef idx="1">
+            <a:schemeClr val="accent1"/>
+          </a:fillRef>
+          <a:effectRef idx="0">
+            <a:schemeClr val="accent1"/>
+          </a:effectRef>
+          <a:fontRef idx="minor">
+            <a:schemeClr val="lt1"/>
+          </a:fontRef>
+        </p:style>
+        <p:txBody>
+          <a:bodyPr rtlCol="0" anchor="ctr"/>
+          <a:lstStyle/>
+          <a:p>
+            <a:pPr algn="ctr"/>
+            <a:r>
+              <a:rPr lang="en-US" dirty="0">
+                <a:solidFill>
+                  <a:schemeClr val="tx1"/>
+                </a:solidFill>
+              </a:rPr>
+              <a:t>2</a:t>
+            </a:r>
+          </a:p>
+        </p:txBody>
+      </p:sp>
+      <p:sp>
+        <p:nvSpPr>
+          <p:cNvPr id="34" name="Oval 33">
+            <a:extLst>
+              <a:ext uri="{FF2B5EF4-FFF2-40B4-BE49-F238E27FC236}">
+                <a16:creationId xmlns:a16="http://schemas.microsoft.com/office/drawing/2014/main" id="{903CD4F1-6ADC-374B-A71B-5B9A284FC46F}"/>
+              </a:ext>
+            </a:extLst>
+          </p:cNvPr>
+          <p:cNvSpPr/>
+          <p:nvPr/>
+        </p:nvSpPr>
+        <p:spPr>
+          <a:xfrm>
+            <a:off x="1619697" y="3196151"/>
+            <a:ext cx="493160" cy="493160"/>
+          </a:xfrm>
+          <a:prstGeom prst="ellipse">
+            <a:avLst/>
+          </a:prstGeom>
+          <a:noFill/>
+          <a:ln>
+            <a:solidFill>
+              <a:schemeClr val="tx1"/>
+            </a:solidFill>
+          </a:ln>
+        </p:spPr>
+        <p:style>
+          <a:lnRef idx="2">
+            <a:schemeClr val="accent1">
+              <a:shade val="50000"/>
+            </a:schemeClr>
+          </a:lnRef>
+          <a:fillRef idx="1">
+            <a:schemeClr val="accent1"/>
+          </a:fillRef>
+          <a:effectRef idx="0">
+            <a:schemeClr val="accent1"/>
+          </a:effectRef>
+          <a:fontRef idx="minor">
+            <a:schemeClr val="lt1"/>
+          </a:fontRef>
+        </p:style>
+        <p:txBody>
+          <a:bodyPr rtlCol="0" anchor="ctr"/>
+          <a:lstStyle/>
+          <a:p>
+            <a:pPr algn="ctr"/>
+            <a:r>
+              <a:rPr lang="en-US" dirty="0">
+                <a:solidFill>
+                  <a:schemeClr val="tx1"/>
+                </a:solidFill>
+              </a:rPr>
+              <a:t>3</a:t>
+            </a:r>
+          </a:p>
+        </p:txBody>
+      </p:sp>
+      <p:sp>
+        <p:nvSpPr>
+          <p:cNvPr id="35" name="Oval 34">
+            <a:extLst>
+              <a:ext uri="{FF2B5EF4-FFF2-40B4-BE49-F238E27FC236}">
+                <a16:creationId xmlns:a16="http://schemas.microsoft.com/office/drawing/2014/main" id="{0DE64844-DF82-5F4B-8930-F9E875C42758}"/>
+              </a:ext>
+            </a:extLst>
+          </p:cNvPr>
+          <p:cNvSpPr/>
+          <p:nvPr/>
+        </p:nvSpPr>
+        <p:spPr>
+          <a:xfrm>
+            <a:off x="3314934" y="3196151"/>
+            <a:ext cx="493160" cy="493160"/>
+          </a:xfrm>
+          <a:prstGeom prst="ellipse">
+            <a:avLst/>
+          </a:prstGeom>
+          <a:noFill/>
+          <a:ln>
+            <a:solidFill>
+              <a:schemeClr val="tx1"/>
+            </a:solidFill>
+          </a:ln>
+        </p:spPr>
+        <p:style>
+          <a:lnRef idx="2">
+            <a:schemeClr val="accent1">
+              <a:shade val="50000"/>
+            </a:schemeClr>
+          </a:lnRef>
+          <a:fillRef idx="1">
+            <a:schemeClr val="accent1"/>
+          </a:fillRef>
+          <a:effectRef idx="0">
+            <a:schemeClr val="accent1"/>
+          </a:effectRef>
+          <a:fontRef idx="minor">
+            <a:schemeClr val="lt1"/>
+          </a:fontRef>
+        </p:style>
+        <p:txBody>
+          <a:bodyPr rtlCol="0" anchor="ctr"/>
+          <a:lstStyle/>
+          <a:p>
+            <a:pPr algn="ctr"/>
+            <a:r>
+              <a:rPr lang="en-US" dirty="0">
+                <a:solidFill>
+                  <a:schemeClr val="tx1"/>
+                </a:solidFill>
+              </a:rPr>
+              <a:t>6</a:t>
+            </a:r>
+          </a:p>
+        </p:txBody>
+      </p:sp>
+      <p:sp>
+        <p:nvSpPr>
+          <p:cNvPr id="36" name="Oval 35">
+            <a:extLst>
+              <a:ext uri="{FF2B5EF4-FFF2-40B4-BE49-F238E27FC236}">
+                <a16:creationId xmlns:a16="http://schemas.microsoft.com/office/drawing/2014/main" id="{FC732AAA-1D7C-FE4C-A4F3-6F49F2B9128B}"/>
+              </a:ext>
+            </a:extLst>
+          </p:cNvPr>
+          <p:cNvSpPr/>
+          <p:nvPr/>
+        </p:nvSpPr>
+        <p:spPr>
+          <a:xfrm>
+            <a:off x="3314934" y="3976129"/>
+            <a:ext cx="493160" cy="493160"/>
+          </a:xfrm>
+          <a:prstGeom prst="ellipse">
+            <a:avLst/>
+          </a:prstGeom>
+          <a:noFill/>
+          <a:ln>
+            <a:solidFill>
+              <a:schemeClr val="tx1"/>
+            </a:solidFill>
+          </a:ln>
+        </p:spPr>
+        <p:style>
+          <a:lnRef idx="2">
+            <a:schemeClr val="accent1">
+              <a:shade val="50000"/>
+            </a:schemeClr>
+          </a:lnRef>
+          <a:fillRef idx="1">
+            <a:schemeClr val="accent1"/>
+          </a:fillRef>
+          <a:effectRef idx="0">
+            <a:schemeClr val="accent1"/>
+          </a:effectRef>
+          <a:fontRef idx="minor">
+            <a:schemeClr val="lt1"/>
+          </a:fontRef>
+        </p:style>
+        <p:txBody>
+          <a:bodyPr rtlCol="0" anchor="ctr"/>
+          <a:lstStyle/>
+          <a:p>
+            <a:pPr algn="ctr"/>
+            <a:r>
+              <a:rPr lang="en-US" dirty="0">
+                <a:solidFill>
+                  <a:schemeClr val="tx1"/>
+                </a:solidFill>
+              </a:rPr>
+              <a:t>7</a:t>
+            </a:r>
+          </a:p>
+        </p:txBody>
+      </p:sp>
+      <p:sp>
+        <p:nvSpPr>
+          <p:cNvPr id="37" name="Oval 36">
+            <a:extLst>
+              <a:ext uri="{FF2B5EF4-FFF2-40B4-BE49-F238E27FC236}">
+                <a16:creationId xmlns:a16="http://schemas.microsoft.com/office/drawing/2014/main" id="{70C22177-D46E-1149-8BDD-48FA0C0AFB3F}"/>
+              </a:ext>
+            </a:extLst>
+          </p:cNvPr>
+          <p:cNvSpPr/>
+          <p:nvPr/>
+        </p:nvSpPr>
+        <p:spPr>
+          <a:xfrm>
+            <a:off x="1126537" y="3976129"/>
+            <a:ext cx="493160" cy="493160"/>
+          </a:xfrm>
+          <a:prstGeom prst="ellipse">
+            <a:avLst/>
+          </a:prstGeom>
+          <a:noFill/>
+          <a:ln>
+            <a:solidFill>
+              <a:schemeClr val="tx1"/>
+            </a:solidFill>
+          </a:ln>
+        </p:spPr>
+        <p:style>
+          <a:lnRef idx="2">
+            <a:schemeClr val="accent1">
+              <a:shade val="50000"/>
+            </a:schemeClr>
+          </a:lnRef>
+          <a:fillRef idx="1">
+            <a:schemeClr val="accent1"/>
+          </a:fillRef>
+          <a:effectRef idx="0">
+            <a:schemeClr val="accent1"/>
+          </a:effectRef>
+          <a:fontRef idx="minor">
+            <a:schemeClr val="lt1"/>
+          </a:fontRef>
+        </p:style>
+        <p:txBody>
+          <a:bodyPr rtlCol="0" anchor="ctr"/>
+          <a:lstStyle/>
+          <a:p>
+            <a:pPr algn="ctr"/>
+            <a:r>
+              <a:rPr lang="en-US" dirty="0">
+                <a:solidFill>
+                  <a:schemeClr val="tx1"/>
+                </a:solidFill>
+              </a:rPr>
+              <a:t>4</a:t>
+            </a:r>
+          </a:p>
+        </p:txBody>
+      </p:sp>
+      <p:sp>
+        <p:nvSpPr>
+          <p:cNvPr id="38" name="Oval 37">
+            <a:extLst>
+              <a:ext uri="{FF2B5EF4-FFF2-40B4-BE49-F238E27FC236}">
+                <a16:creationId xmlns:a16="http://schemas.microsoft.com/office/drawing/2014/main" id="{1627EC68-ED1E-CF44-9700-29DDB8674744}"/>
+              </a:ext>
+            </a:extLst>
+          </p:cNvPr>
+          <p:cNvSpPr/>
+          <p:nvPr/>
+        </p:nvSpPr>
+        <p:spPr>
+          <a:xfrm>
+            <a:off x="2040937" y="3976129"/>
+            <a:ext cx="493160" cy="493160"/>
+          </a:xfrm>
+          <a:prstGeom prst="ellipse">
+            <a:avLst/>
+          </a:prstGeom>
+          <a:noFill/>
+          <a:ln>
+            <a:solidFill>
+              <a:schemeClr val="tx1"/>
+            </a:solidFill>
+          </a:ln>
+        </p:spPr>
+        <p:style>
+          <a:lnRef idx="2">
+            <a:schemeClr val="accent1">
+              <a:shade val="50000"/>
+            </a:schemeClr>
+          </a:lnRef>
+          <a:fillRef idx="1">
+            <a:schemeClr val="accent1"/>
+          </a:fillRef>
+          <a:effectRef idx="0">
+            <a:schemeClr val="accent1"/>
+          </a:effectRef>
+          <a:fontRef idx="minor">
+            <a:schemeClr val="lt1"/>
+          </a:fontRef>
+        </p:style>
+        <p:txBody>
+          <a:bodyPr rtlCol="0" anchor="ctr"/>
+          <a:lstStyle/>
+          <a:p>
+            <a:pPr algn="ctr"/>
+            <a:r>
+              <a:rPr lang="en-US" dirty="0">
+                <a:solidFill>
+                  <a:schemeClr val="tx1"/>
+                </a:solidFill>
+              </a:rPr>
+              <a:t>5</a:t>
+            </a:r>
+          </a:p>
+        </p:txBody>
+      </p:sp>
+      <p:sp>
+        <p:nvSpPr>
+          <p:cNvPr id="39" name="Oval 38">
+            <a:extLst>
+              <a:ext uri="{FF2B5EF4-FFF2-40B4-BE49-F238E27FC236}">
+                <a16:creationId xmlns:a16="http://schemas.microsoft.com/office/drawing/2014/main" id="{AD0B9982-444D-3B4B-B14B-998BF829E730}"/>
+              </a:ext>
+            </a:extLst>
+          </p:cNvPr>
+          <p:cNvSpPr/>
+          <p:nvPr/>
+        </p:nvSpPr>
+        <p:spPr>
+          <a:xfrm>
+            <a:off x="1126537" y="4931627"/>
+            <a:ext cx="493160" cy="493160"/>
+          </a:xfrm>
+          <a:prstGeom prst="ellipse">
+            <a:avLst/>
+          </a:prstGeom>
+          <a:noFill/>
+          <a:ln>
+            <a:solidFill>
+              <a:schemeClr val="tx1"/>
+            </a:solidFill>
+          </a:ln>
+        </p:spPr>
+        <p:style>
+          <a:lnRef idx="2">
+            <a:schemeClr val="accent1">
+              <a:shade val="50000"/>
+            </a:schemeClr>
+          </a:lnRef>
+          <a:fillRef idx="1">
+            <a:schemeClr val="accent1"/>
+          </a:fillRef>
+          <a:effectRef idx="0">
+            <a:schemeClr val="accent1"/>
+          </a:effectRef>
+          <a:fontRef idx="minor">
+            <a:schemeClr val="lt1"/>
+          </a:fontRef>
+        </p:style>
+        <p:txBody>
+          <a:bodyPr rtlCol="0" anchor="ctr"/>
+          <a:lstStyle/>
+          <a:p>
+            <a:pPr algn="ctr"/>
+            <a:r>
+              <a:rPr lang="en-US" dirty="0">
+                <a:solidFill>
+                  <a:schemeClr val="tx1"/>
+                </a:solidFill>
+              </a:rPr>
+              <a:t>8</a:t>
+            </a:r>
+          </a:p>
+        </p:txBody>
+      </p:sp>
+      <p:sp>
+        <p:nvSpPr>
+          <p:cNvPr id="40" name="Oval 39">
+            <a:extLst>
+              <a:ext uri="{FF2B5EF4-FFF2-40B4-BE49-F238E27FC236}">
+                <a16:creationId xmlns:a16="http://schemas.microsoft.com/office/drawing/2014/main" id="{6EBF18CB-EF70-7746-82DB-CF95FB5A106A}"/>
+              </a:ext>
+            </a:extLst>
+          </p:cNvPr>
+          <p:cNvSpPr/>
+          <p:nvPr/>
+        </p:nvSpPr>
+        <p:spPr>
+          <a:xfrm>
+            <a:off x="2040937" y="4931627"/>
+            <a:ext cx="493160" cy="493160"/>
+          </a:xfrm>
+          <a:prstGeom prst="ellipse">
+            <a:avLst/>
+          </a:prstGeom>
+          <a:noFill/>
+          <a:ln>
+            <a:solidFill>
+              <a:schemeClr val="tx1"/>
+            </a:solidFill>
+          </a:ln>
+        </p:spPr>
+        <p:style>
+          <a:lnRef idx="2">
+            <a:schemeClr val="accent1">
+              <a:shade val="50000"/>
+            </a:schemeClr>
+          </a:lnRef>
+          <a:fillRef idx="1">
+            <a:schemeClr val="accent1"/>
+          </a:fillRef>
+          <a:effectRef idx="0">
+            <a:schemeClr val="accent1"/>
+          </a:effectRef>
+          <a:fontRef idx="minor">
+            <a:schemeClr val="lt1"/>
+          </a:fontRef>
+        </p:style>
+        <p:txBody>
+          <a:bodyPr rtlCol="0" anchor="ctr"/>
+          <a:lstStyle/>
+          <a:p>
+            <a:pPr algn="ctr"/>
+            <a:r>
+              <a:rPr lang="en-US" dirty="0">
+                <a:solidFill>
+                  <a:schemeClr val="tx1"/>
+                </a:solidFill>
+              </a:rPr>
+              <a:t>9</a:t>
+            </a:r>
+          </a:p>
+        </p:txBody>
+      </p:sp>
+      <p:sp>
+        <p:nvSpPr>
+          <p:cNvPr id="41" name="Oval 40">
+            <a:extLst>
+              <a:ext uri="{FF2B5EF4-FFF2-40B4-BE49-F238E27FC236}">
+                <a16:creationId xmlns:a16="http://schemas.microsoft.com/office/drawing/2014/main" id="{5DD254CB-A2FA-CB4C-B4FB-2E49363FED0D}"/>
+              </a:ext>
+            </a:extLst>
+          </p:cNvPr>
+          <p:cNvSpPr/>
+          <p:nvPr/>
+        </p:nvSpPr>
+        <p:spPr>
+          <a:xfrm>
+            <a:off x="3314933" y="4931627"/>
+            <a:ext cx="493160" cy="493160"/>
+          </a:xfrm>
+          <a:prstGeom prst="ellipse">
+            <a:avLst/>
+          </a:prstGeom>
+          <a:noFill/>
+          <a:ln>
+            <a:solidFill>
+              <a:schemeClr val="tx1"/>
+            </a:solidFill>
+          </a:ln>
+        </p:spPr>
+        <p:style>
+          <a:lnRef idx="2">
+            <a:schemeClr val="accent1">
+              <a:shade val="50000"/>
+            </a:schemeClr>
+          </a:lnRef>
+          <a:fillRef idx="1">
+            <a:schemeClr val="accent1"/>
+          </a:fillRef>
+          <a:effectRef idx="0">
+            <a:schemeClr val="accent1"/>
+          </a:effectRef>
+          <a:fontRef idx="minor">
+            <a:schemeClr val="lt1"/>
+          </a:fontRef>
+        </p:style>
+        <p:txBody>
+          <a:bodyPr rtlCol="0" anchor="ctr"/>
+          <a:lstStyle/>
+          <a:p>
+            <a:pPr algn="ctr"/>
+            <a:r>
+              <a:rPr lang="en-US" sz="1200" dirty="0">
+                <a:solidFill>
+                  <a:schemeClr val="tx1"/>
+                </a:solidFill>
+              </a:rPr>
+              <a:t>10</a:t>
+            </a:r>
+          </a:p>
+        </p:txBody>
+      </p:sp>
+      <p:cxnSp>
+        <p:nvCxnSpPr>
+          <p:cNvPr id="42" name="Straight Arrow Connector 41">
+            <a:extLst>
+              <a:ext uri="{FF2B5EF4-FFF2-40B4-BE49-F238E27FC236}">
+                <a16:creationId xmlns:a16="http://schemas.microsoft.com/office/drawing/2014/main" id="{5D377682-BF0E-3849-9862-A34A9122DE7C}"/>
+              </a:ext>
+            </a:extLst>
+          </p:cNvPr>
+          <p:cNvCxnSpPr>
+            <a:stCxn id="35" idx="4"/>
+            <a:endCxn id="36" idx="0"/>
+          </p:cNvCxnSpPr>
+          <p:nvPr/>
+        </p:nvCxnSpPr>
+        <p:spPr>
+          <a:xfrm>
+            <a:off x="3561514" y="3689311"/>
+            <a:ext cx="0" cy="286818"/>
+          </a:xfrm>
+          <a:prstGeom prst="straightConnector1">
+            <a:avLst/>
+          </a:prstGeom>
+          <a:ln>
+            <a:solidFill>
+              <a:schemeClr val="tx1"/>
+            </a:solidFill>
+            <a:tailEnd type="triangle"/>
+          </a:ln>
+        </p:spPr>
+        <p:style>
+          <a:lnRef idx="1">
+            <a:schemeClr val="accent1"/>
+          </a:lnRef>
+          <a:fillRef idx="0">
+            <a:schemeClr val="accent1"/>
+          </a:fillRef>
+          <a:effectRef idx="0">
+            <a:schemeClr val="accent1"/>
+          </a:effectRef>
+          <a:fontRef idx="minor">
+            <a:schemeClr val="tx1"/>
+          </a:fontRef>
+        </p:style>
+      </p:cxnSp>
+      <p:cxnSp>
+        <p:nvCxnSpPr>
+          <p:cNvPr id="43" name="Straight Arrow Connector 42">
+            <a:extLst>
+              <a:ext uri="{FF2B5EF4-FFF2-40B4-BE49-F238E27FC236}">
+                <a16:creationId xmlns:a16="http://schemas.microsoft.com/office/drawing/2014/main" id="{3C2FC4B9-7A23-2B48-9AFA-D27C49B79225}"/>
+              </a:ext>
+            </a:extLst>
+          </p:cNvPr>
+          <p:cNvCxnSpPr>
+            <a:cxnSpLocks/>
+            <a:stCxn id="36" idx="4"/>
+            <a:endCxn id="41" idx="0"/>
+          </p:cNvCxnSpPr>
+          <p:nvPr/>
+        </p:nvCxnSpPr>
+        <p:spPr>
+          <a:xfrm flipH="1">
+            <a:off x="3561513" y="4469289"/>
+            <a:ext cx="1" cy="462338"/>
+          </a:xfrm>
+          <a:prstGeom prst="straightConnector1">
+            <a:avLst/>
+          </a:prstGeom>
+          <a:ln>
+            <a:solidFill>
+              <a:schemeClr val="tx1"/>
+            </a:solidFill>
+            <a:tailEnd type="triangle"/>
+          </a:ln>
+        </p:spPr>
+        <p:style>
+          <a:lnRef idx="1">
+            <a:schemeClr val="accent1"/>
+          </a:lnRef>
+          <a:fillRef idx="0">
+            <a:schemeClr val="accent1"/>
+          </a:fillRef>
+          <a:effectRef idx="0">
+            <a:schemeClr val="accent1"/>
+          </a:effectRef>
+          <a:fontRef idx="minor">
+            <a:schemeClr val="tx1"/>
+          </a:fontRef>
+        </p:style>
+      </p:cxnSp>
+      <p:cxnSp>
+        <p:nvCxnSpPr>
+          <p:cNvPr id="44" name="Straight Arrow Connector 43">
+            <a:extLst>
+              <a:ext uri="{FF2B5EF4-FFF2-40B4-BE49-F238E27FC236}">
+                <a16:creationId xmlns:a16="http://schemas.microsoft.com/office/drawing/2014/main" id="{36CB5BB8-63CB-514C-A0F1-763A0FB2B74E}"/>
+              </a:ext>
+            </a:extLst>
+          </p:cNvPr>
+          <p:cNvCxnSpPr>
+            <a:cxnSpLocks/>
+            <a:stCxn id="38" idx="4"/>
+            <a:endCxn id="40" idx="0"/>
+          </p:cNvCxnSpPr>
+          <p:nvPr/>
+        </p:nvCxnSpPr>
+        <p:spPr>
+          <a:xfrm>
+            <a:off x="2287517" y="4469289"/>
+            <a:ext cx="0" cy="462338"/>
+          </a:xfrm>
+          <a:prstGeom prst="straightConnector1">
+            <a:avLst/>
+          </a:prstGeom>
+          <a:ln>
+            <a:solidFill>
+              <a:schemeClr val="tx1"/>
+            </a:solidFill>
+            <a:tailEnd type="triangle"/>
+          </a:ln>
+        </p:spPr>
+        <p:style>
+          <a:lnRef idx="1">
+            <a:schemeClr val="accent1"/>
+          </a:lnRef>
+          <a:fillRef idx="0">
+            <a:schemeClr val="accent1"/>
+          </a:fillRef>
+          <a:effectRef idx="0">
+            <a:schemeClr val="accent1"/>
+          </a:effectRef>
+          <a:fontRef idx="minor">
+            <a:schemeClr val="tx1"/>
+          </a:fontRef>
+        </p:style>
+      </p:cxnSp>
+      <p:cxnSp>
+        <p:nvCxnSpPr>
+          <p:cNvPr id="45" name="Straight Arrow Connector 44">
+            <a:extLst>
+              <a:ext uri="{FF2B5EF4-FFF2-40B4-BE49-F238E27FC236}">
+                <a16:creationId xmlns:a16="http://schemas.microsoft.com/office/drawing/2014/main" id="{61162574-D778-C545-93F0-66AAA771A921}"/>
+              </a:ext>
+            </a:extLst>
+          </p:cNvPr>
+          <p:cNvCxnSpPr>
+            <a:cxnSpLocks/>
+            <a:stCxn id="34" idx="4"/>
+            <a:endCxn id="38" idx="0"/>
+          </p:cNvCxnSpPr>
+          <p:nvPr/>
+        </p:nvCxnSpPr>
+        <p:spPr>
+          <a:xfrm>
+            <a:off x="1866277" y="3689311"/>
+            <a:ext cx="421240" cy="286818"/>
+          </a:xfrm>
+          <a:prstGeom prst="straightConnector1">
+            <a:avLst/>
+          </a:prstGeom>
+          <a:ln>
+            <a:solidFill>
+              <a:schemeClr val="tx1"/>
+            </a:solidFill>
+            <a:tailEnd type="triangle"/>
+          </a:ln>
+        </p:spPr>
+        <p:style>
+          <a:lnRef idx="1">
+            <a:schemeClr val="accent1"/>
+          </a:lnRef>
+          <a:fillRef idx="0">
+            <a:schemeClr val="accent1"/>
+          </a:fillRef>
+          <a:effectRef idx="0">
+            <a:schemeClr val="accent1"/>
+          </a:effectRef>
+          <a:fontRef idx="minor">
+            <a:schemeClr val="tx1"/>
+          </a:fontRef>
+        </p:style>
+      </p:cxnSp>
+      <p:cxnSp>
+        <p:nvCxnSpPr>
+          <p:cNvPr id="46" name="Straight Arrow Connector 45">
+            <a:extLst>
+              <a:ext uri="{FF2B5EF4-FFF2-40B4-BE49-F238E27FC236}">
+                <a16:creationId xmlns:a16="http://schemas.microsoft.com/office/drawing/2014/main" id="{1FCBC232-D0C0-6B42-97BB-515250AE6138}"/>
+              </a:ext>
+            </a:extLst>
+          </p:cNvPr>
+          <p:cNvCxnSpPr>
+            <a:cxnSpLocks/>
+            <a:stCxn id="34" idx="4"/>
+            <a:endCxn id="37" idx="0"/>
+          </p:cNvCxnSpPr>
+          <p:nvPr/>
+        </p:nvCxnSpPr>
+        <p:spPr>
+          <a:xfrm flipH="1">
+            <a:off x="1373117" y="3689311"/>
+            <a:ext cx="493160" cy="286818"/>
+          </a:xfrm>
+          <a:prstGeom prst="straightConnector1">
+            <a:avLst/>
+          </a:prstGeom>
+          <a:ln>
+            <a:solidFill>
+              <a:schemeClr val="tx1"/>
+            </a:solidFill>
+            <a:tailEnd type="triangle"/>
+          </a:ln>
+        </p:spPr>
+        <p:style>
+          <a:lnRef idx="1">
+            <a:schemeClr val="accent1"/>
+          </a:lnRef>
+          <a:fillRef idx="0">
+            <a:schemeClr val="accent1"/>
+          </a:fillRef>
+          <a:effectRef idx="0">
+            <a:schemeClr val="accent1"/>
+          </a:effectRef>
+          <a:fontRef idx="minor">
+            <a:schemeClr val="tx1"/>
+          </a:fontRef>
+        </p:style>
+      </p:cxnSp>
+      <p:cxnSp>
+        <p:nvCxnSpPr>
+          <p:cNvPr id="47" name="Straight Arrow Connector 46">
+            <a:extLst>
+              <a:ext uri="{FF2B5EF4-FFF2-40B4-BE49-F238E27FC236}">
+                <a16:creationId xmlns:a16="http://schemas.microsoft.com/office/drawing/2014/main" id="{A1415F2B-99FF-AC4C-AEE7-D0CEBF63F70F}"/>
+              </a:ext>
+            </a:extLst>
+          </p:cNvPr>
+          <p:cNvCxnSpPr>
+            <a:cxnSpLocks/>
+            <a:stCxn id="37" idx="4"/>
+            <a:endCxn id="39" idx="0"/>
+          </p:cNvCxnSpPr>
+          <p:nvPr/>
+        </p:nvCxnSpPr>
+        <p:spPr>
+          <a:xfrm>
+            <a:off x="1373117" y="4469289"/>
+            <a:ext cx="0" cy="462338"/>
+          </a:xfrm>
+          <a:prstGeom prst="straightConnector1">
+            <a:avLst/>
+          </a:prstGeom>
+          <a:ln>
+            <a:solidFill>
+              <a:schemeClr val="tx1"/>
+            </a:solidFill>
+            <a:tailEnd type="triangle"/>
+          </a:ln>
+        </p:spPr>
+        <p:style>
+          <a:lnRef idx="1">
+            <a:schemeClr val="accent1"/>
+          </a:lnRef>
+          <a:fillRef idx="0">
+            <a:schemeClr val="accent1"/>
+          </a:fillRef>
+          <a:effectRef idx="0">
+            <a:schemeClr val="accent1"/>
+          </a:effectRef>
+          <a:fontRef idx="minor">
+            <a:schemeClr val="tx1"/>
+          </a:fontRef>
+        </p:style>
+      </p:cxnSp>
+      <p:cxnSp>
+        <p:nvCxnSpPr>
+          <p:cNvPr id="48" name="Straight Arrow Connector 47">
+            <a:extLst>
+              <a:ext uri="{FF2B5EF4-FFF2-40B4-BE49-F238E27FC236}">
+                <a16:creationId xmlns:a16="http://schemas.microsoft.com/office/drawing/2014/main" id="{0F112471-FB24-EC40-9576-2C9D7CBBA525}"/>
+              </a:ext>
+            </a:extLst>
+          </p:cNvPr>
+          <p:cNvCxnSpPr>
+            <a:cxnSpLocks/>
+            <a:stCxn id="32" idx="4"/>
+            <a:endCxn id="33" idx="0"/>
+          </p:cNvCxnSpPr>
+          <p:nvPr/>
+        </p:nvCxnSpPr>
+        <p:spPr>
+          <a:xfrm>
+            <a:off x="2780677" y="1975238"/>
+            <a:ext cx="0" cy="265415"/>
+          </a:xfrm>
+          <a:prstGeom prst="straightConnector1">
+            <a:avLst/>
+          </a:prstGeom>
+          <a:ln>
+            <a:solidFill>
+              <a:schemeClr val="tx1"/>
+            </a:solidFill>
+            <a:tailEnd type="triangle"/>
+          </a:ln>
+        </p:spPr>
+        <p:style>
+          <a:lnRef idx="1">
+            <a:schemeClr val="accent1"/>
+          </a:lnRef>
+          <a:fillRef idx="0">
+            <a:schemeClr val="accent1"/>
+          </a:fillRef>
+          <a:effectRef idx="0">
+            <a:schemeClr val="accent1"/>
+          </a:effectRef>
+          <a:fontRef idx="minor">
+            <a:schemeClr val="tx1"/>
+          </a:fontRef>
+        </p:style>
+      </p:cxnSp>
+      <p:cxnSp>
+        <p:nvCxnSpPr>
+          <p:cNvPr id="49" name="Straight Arrow Connector 48">
+            <a:extLst>
+              <a:ext uri="{FF2B5EF4-FFF2-40B4-BE49-F238E27FC236}">
+                <a16:creationId xmlns:a16="http://schemas.microsoft.com/office/drawing/2014/main" id="{0A9DFB7D-5BD8-D34E-8E6F-DEF553AA9D5B}"/>
+              </a:ext>
+            </a:extLst>
+          </p:cNvPr>
+          <p:cNvCxnSpPr>
+            <a:cxnSpLocks/>
+            <a:stCxn id="33" idx="4"/>
+            <a:endCxn id="35" idx="0"/>
+          </p:cNvCxnSpPr>
+          <p:nvPr/>
+        </p:nvCxnSpPr>
+        <p:spPr>
+          <a:xfrm>
+            <a:off x="2780677" y="2733813"/>
+            <a:ext cx="780837" cy="462338"/>
+          </a:xfrm>
+          <a:prstGeom prst="straightConnector1">
+            <a:avLst/>
+          </a:prstGeom>
+          <a:ln>
+            <a:solidFill>
+              <a:schemeClr val="tx1"/>
+            </a:solidFill>
+            <a:tailEnd type="triangle"/>
+          </a:ln>
+        </p:spPr>
+        <p:style>
+          <a:lnRef idx="1">
+            <a:schemeClr val="accent1"/>
+          </a:lnRef>
+          <a:fillRef idx="0">
+            <a:schemeClr val="accent1"/>
+          </a:fillRef>
+          <a:effectRef idx="0">
+            <a:schemeClr val="accent1"/>
+          </a:effectRef>
+          <a:fontRef idx="minor">
+            <a:schemeClr val="tx1"/>
+          </a:fontRef>
+        </p:style>
+      </p:cxnSp>
+      <p:cxnSp>
+        <p:nvCxnSpPr>
+          <p:cNvPr id="50" name="Straight Arrow Connector 49">
+            <a:extLst>
+              <a:ext uri="{FF2B5EF4-FFF2-40B4-BE49-F238E27FC236}">
+                <a16:creationId xmlns:a16="http://schemas.microsoft.com/office/drawing/2014/main" id="{1C8084B2-183F-5F4D-B95A-76E865E64857}"/>
+              </a:ext>
+            </a:extLst>
+          </p:cNvPr>
+          <p:cNvCxnSpPr>
+            <a:cxnSpLocks/>
+            <a:stCxn id="33" idx="4"/>
+            <a:endCxn id="34" idx="0"/>
+          </p:cNvCxnSpPr>
+          <p:nvPr/>
+        </p:nvCxnSpPr>
+        <p:spPr>
+          <a:xfrm flipH="1">
+            <a:off x="1866277" y="2733813"/>
+            <a:ext cx="914400" cy="462338"/>
+          </a:xfrm>
+          <a:prstGeom prst="straightConnector1">
+            <a:avLst/>
+          </a:prstGeom>
+          <a:ln>
+            <a:solidFill>
+              <a:schemeClr val="tx1"/>
+            </a:solidFill>
+            <a:tailEnd type="triangle"/>
+          </a:ln>
+        </p:spPr>
+        <p:style>
+          <a:lnRef idx="1">
+            <a:schemeClr val="accent1"/>
+          </a:lnRef>
+          <a:fillRef idx="0">
+            <a:schemeClr val="accent1"/>
+          </a:fillRef>
+          <a:effectRef idx="0">
+            <a:schemeClr val="accent1"/>
+          </a:effectRef>
+          <a:fontRef idx="minor">
+            <a:schemeClr val="tx1"/>
+          </a:fontRef>
+        </p:style>
+      </p:cxnSp>
+      <p:cxnSp>
+        <p:nvCxnSpPr>
+          <p:cNvPr id="51" name="Straight Connector 50">
+            <a:extLst>
+              <a:ext uri="{FF2B5EF4-FFF2-40B4-BE49-F238E27FC236}">
+                <a16:creationId xmlns:a16="http://schemas.microsoft.com/office/drawing/2014/main" id="{308E64B6-552E-4F49-8D5E-9EFF019542EB}"/>
+              </a:ext>
+            </a:extLst>
+          </p:cNvPr>
+          <p:cNvCxnSpPr>
+            <a:cxnSpLocks/>
+          </p:cNvCxnSpPr>
+          <p:nvPr/>
+        </p:nvCxnSpPr>
+        <p:spPr>
+          <a:xfrm>
+            <a:off x="766944" y="2910187"/>
+            <a:ext cx="3493213" cy="0"/>
+          </a:xfrm>
+          <a:prstGeom prst="line">
+            <a:avLst/>
+          </a:prstGeom>
+          <a:ln>
+            <a:prstDash val="dash"/>
+          </a:ln>
+        </p:spPr>
+        <p:style>
+          <a:lnRef idx="1">
+            <a:schemeClr val="accent1"/>
+          </a:lnRef>
+          <a:fillRef idx="0">
+            <a:schemeClr val="accent1"/>
+          </a:fillRef>
+          <a:effectRef idx="0">
+            <a:schemeClr val="accent1"/>
+          </a:effectRef>
+          <a:fontRef idx="minor">
+            <a:schemeClr val="tx1"/>
+          </a:fontRef>
+        </p:style>
+      </p:cxnSp>
+      <p:cxnSp>
+        <p:nvCxnSpPr>
+          <p:cNvPr id="52" name="Straight Connector 51">
+            <a:extLst>
+              <a:ext uri="{FF2B5EF4-FFF2-40B4-BE49-F238E27FC236}">
+                <a16:creationId xmlns:a16="http://schemas.microsoft.com/office/drawing/2014/main" id="{B29E0569-1325-C24A-ACAB-15E36E2068E7}"/>
+              </a:ext>
+            </a:extLst>
+          </p:cNvPr>
+          <p:cNvCxnSpPr>
+            <a:cxnSpLocks/>
+          </p:cNvCxnSpPr>
+          <p:nvPr/>
+        </p:nvCxnSpPr>
+        <p:spPr>
+          <a:xfrm>
+            <a:off x="766944" y="4644808"/>
+            <a:ext cx="3493213" cy="0"/>
+          </a:xfrm>
+          <a:prstGeom prst="line">
+            <a:avLst/>
+          </a:prstGeom>
+          <a:ln>
+            <a:prstDash val="dash"/>
+          </a:ln>
+        </p:spPr>
+        <p:style>
+          <a:lnRef idx="1">
+            <a:schemeClr val="accent1"/>
+          </a:lnRef>
+          <a:fillRef idx="0">
+            <a:schemeClr val="accent1"/>
+          </a:fillRef>
+          <a:effectRef idx="0">
+            <a:schemeClr val="accent1"/>
+          </a:effectRef>
+          <a:fontRef idx="minor">
+            <a:schemeClr val="tx1"/>
+          </a:fontRef>
+        </p:style>
+      </p:cxnSp>
+      <p:cxnSp>
+        <p:nvCxnSpPr>
+          <p:cNvPr id="53" name="Straight Connector 52">
+            <a:extLst>
+              <a:ext uri="{FF2B5EF4-FFF2-40B4-BE49-F238E27FC236}">
+                <a16:creationId xmlns:a16="http://schemas.microsoft.com/office/drawing/2014/main" id="{884AE8EE-98E1-724A-ABE8-F9638D8EDC7D}"/>
+              </a:ext>
+            </a:extLst>
+          </p:cNvPr>
+          <p:cNvCxnSpPr>
+            <a:cxnSpLocks/>
+          </p:cNvCxnSpPr>
+          <p:nvPr/>
+        </p:nvCxnSpPr>
+        <p:spPr>
+          <a:xfrm>
+            <a:off x="2780677" y="2910187"/>
+            <a:ext cx="0" cy="2671281"/>
+          </a:xfrm>
+          <a:prstGeom prst="line">
+            <a:avLst/>
+          </a:prstGeom>
+          <a:ln>
+            <a:prstDash val="dash"/>
+          </a:ln>
+        </p:spPr>
+        <p:style>
+          <a:lnRef idx="1">
+            <a:schemeClr val="accent1"/>
+          </a:lnRef>
+          <a:fillRef idx="0">
+            <a:schemeClr val="accent1"/>
+          </a:fillRef>
+          <a:effectRef idx="0">
+            <a:schemeClr val="accent1"/>
+          </a:effectRef>
+          <a:fontRef idx="minor">
+            <a:schemeClr val="tx1"/>
+          </a:fontRef>
+        </p:style>
+      </p:cxnSp>
+      <p:cxnSp>
+        <p:nvCxnSpPr>
+          <p:cNvPr id="54" name="Straight Connector 53">
+            <a:extLst>
+              <a:ext uri="{FF2B5EF4-FFF2-40B4-BE49-F238E27FC236}">
+                <a16:creationId xmlns:a16="http://schemas.microsoft.com/office/drawing/2014/main" id="{A42AFFCF-1C30-1F45-8D19-65070470867B}"/>
+              </a:ext>
+            </a:extLst>
+          </p:cNvPr>
+          <p:cNvCxnSpPr>
+            <a:cxnSpLocks/>
+          </p:cNvCxnSpPr>
+          <p:nvPr/>
+        </p:nvCxnSpPr>
+        <p:spPr>
+          <a:xfrm>
+            <a:off x="1792648" y="4667926"/>
+            <a:ext cx="0" cy="913542"/>
+          </a:xfrm>
+          <a:prstGeom prst="line">
+            <a:avLst/>
+          </a:prstGeom>
+          <a:ln>
+            <a:prstDash val="dash"/>
+          </a:ln>
+        </p:spPr>
+        <p:style>
+          <a:lnRef idx="1">
+            <a:schemeClr val="accent1"/>
+          </a:lnRef>
+          <a:fillRef idx="0">
+            <a:schemeClr val="accent1"/>
+          </a:fillRef>
+          <a:effectRef idx="0">
+            <a:schemeClr val="accent1"/>
+          </a:effectRef>
+          <a:fontRef idx="minor">
+            <a:schemeClr val="tx1"/>
+          </a:fontRef>
+        </p:style>
+      </p:cxnSp>
+      <p:sp>
+        <p:nvSpPr>
+          <p:cNvPr id="55" name="TextBox 54">
+            <a:extLst>
+              <a:ext uri="{FF2B5EF4-FFF2-40B4-BE49-F238E27FC236}">
+                <a16:creationId xmlns:a16="http://schemas.microsoft.com/office/drawing/2014/main" id="{E1876040-B571-CB4F-B928-09755D90573D}"/>
+              </a:ext>
+            </a:extLst>
+          </p:cNvPr>
+          <p:cNvSpPr txBox="1"/>
+          <p:nvPr/>
+        </p:nvSpPr>
+        <p:spPr>
+          <a:xfrm>
+            <a:off x="766944" y="1482077"/>
+            <a:ext cx="976549" cy="338554"/>
+          </a:xfrm>
+          <a:prstGeom prst="rect">
+            <a:avLst/>
+          </a:prstGeom>
+          <a:noFill/>
+        </p:spPr>
+        <p:txBody>
+          <a:bodyPr wrap="none" rtlCol="0">
+            <a:spAutoFit/>
+          </a:bodyPr>
+          <a:lstStyle/>
+          <a:p>
+            <a:r>
+              <a:rPr lang="en-US" sz="1600" dirty="0">
+                <a:solidFill>
+                  <a:schemeClr val="accent1"/>
+                </a:solidFill>
+              </a:rPr>
+              <a:t>S1, S2, S3</a:t>
+            </a:r>
+          </a:p>
+        </p:txBody>
+      </p:sp>
+      <p:sp>
+        <p:nvSpPr>
+          <p:cNvPr id="56" name="TextBox 55">
+            <a:extLst>
+              <a:ext uri="{FF2B5EF4-FFF2-40B4-BE49-F238E27FC236}">
+                <a16:creationId xmlns:a16="http://schemas.microsoft.com/office/drawing/2014/main" id="{15863EAA-7E04-8247-95D5-CD5DAB016B68}"/>
+              </a:ext>
+            </a:extLst>
+          </p:cNvPr>
+          <p:cNvSpPr txBox="1"/>
+          <p:nvPr/>
+        </p:nvSpPr>
+        <p:spPr>
+          <a:xfrm>
+            <a:off x="722996" y="2987064"/>
+            <a:ext cx="679994" cy="338554"/>
+          </a:xfrm>
+          <a:prstGeom prst="rect">
+            <a:avLst/>
+          </a:prstGeom>
+          <a:noFill/>
+        </p:spPr>
+        <p:txBody>
+          <a:bodyPr wrap="none" rtlCol="0">
+            <a:spAutoFit/>
+          </a:bodyPr>
+          <a:lstStyle/>
+          <a:p>
+            <a:r>
+              <a:rPr lang="en-US" sz="1600" dirty="0">
+                <a:solidFill>
+                  <a:schemeClr val="accent1"/>
+                </a:solidFill>
+              </a:rPr>
+              <a:t>S1, S3</a:t>
+            </a:r>
+          </a:p>
+        </p:txBody>
+      </p:sp>
+      <p:sp>
+        <p:nvSpPr>
+          <p:cNvPr id="57" name="TextBox 56">
+            <a:extLst>
+              <a:ext uri="{FF2B5EF4-FFF2-40B4-BE49-F238E27FC236}">
+                <a16:creationId xmlns:a16="http://schemas.microsoft.com/office/drawing/2014/main" id="{5A11814A-5D21-9E40-9CCE-2C7B10863B93}"/>
+              </a:ext>
+            </a:extLst>
+          </p:cNvPr>
+          <p:cNvSpPr txBox="1"/>
+          <p:nvPr/>
+        </p:nvSpPr>
+        <p:spPr>
+          <a:xfrm>
+            <a:off x="3854075" y="2987064"/>
+            <a:ext cx="679994" cy="338554"/>
+          </a:xfrm>
+          <a:prstGeom prst="rect">
+            <a:avLst/>
+          </a:prstGeom>
+          <a:noFill/>
+        </p:spPr>
+        <p:txBody>
+          <a:bodyPr wrap="none" rtlCol="0">
+            <a:spAutoFit/>
+          </a:bodyPr>
+          <a:lstStyle/>
+          <a:p>
+            <a:r>
+              <a:rPr lang="en-US" sz="1600" dirty="0">
+                <a:solidFill>
+                  <a:schemeClr val="accent1"/>
+                </a:solidFill>
+              </a:rPr>
+              <a:t>S1, S2</a:t>
+            </a:r>
+          </a:p>
+        </p:txBody>
+      </p:sp>
+      <p:sp>
+        <p:nvSpPr>
+          <p:cNvPr id="58" name="TextBox 57">
+            <a:extLst>
+              <a:ext uri="{FF2B5EF4-FFF2-40B4-BE49-F238E27FC236}">
+                <a16:creationId xmlns:a16="http://schemas.microsoft.com/office/drawing/2014/main" id="{5E3ECC3F-01D2-0945-AE28-9517F5139D57}"/>
+              </a:ext>
+            </a:extLst>
+          </p:cNvPr>
+          <p:cNvSpPr txBox="1"/>
+          <p:nvPr/>
+        </p:nvSpPr>
+        <p:spPr>
+          <a:xfrm>
+            <a:off x="723477" y="4658015"/>
+            <a:ext cx="383438" cy="338554"/>
+          </a:xfrm>
+          <a:prstGeom prst="rect">
+            <a:avLst/>
+          </a:prstGeom>
+          <a:noFill/>
+        </p:spPr>
+        <p:txBody>
+          <a:bodyPr wrap="none" rtlCol="0">
+            <a:spAutoFit/>
+          </a:bodyPr>
+          <a:lstStyle/>
+          <a:p>
+            <a:r>
+              <a:rPr lang="en-US" sz="1600" dirty="0">
+                <a:solidFill>
+                  <a:schemeClr val="accent1"/>
+                </a:solidFill>
+              </a:rPr>
+              <a:t>S1</a:t>
+            </a:r>
+          </a:p>
+        </p:txBody>
+      </p:sp>
+      <p:sp>
+        <p:nvSpPr>
+          <p:cNvPr id="59" name="TextBox 58">
+            <a:extLst>
+              <a:ext uri="{FF2B5EF4-FFF2-40B4-BE49-F238E27FC236}">
+                <a16:creationId xmlns:a16="http://schemas.microsoft.com/office/drawing/2014/main" id="{D4785CD1-861B-3B41-A6B8-D9BB6F7EA423}"/>
+              </a:ext>
+            </a:extLst>
+          </p:cNvPr>
+          <p:cNvSpPr txBox="1"/>
+          <p:nvPr/>
+        </p:nvSpPr>
+        <p:spPr>
+          <a:xfrm>
+            <a:off x="1819516" y="4667926"/>
+            <a:ext cx="383438" cy="338554"/>
+          </a:xfrm>
+          <a:prstGeom prst="rect">
+            <a:avLst/>
+          </a:prstGeom>
+          <a:noFill/>
+        </p:spPr>
+        <p:txBody>
+          <a:bodyPr wrap="none" rtlCol="0">
+            <a:spAutoFit/>
+          </a:bodyPr>
+          <a:lstStyle/>
+          <a:p>
+            <a:r>
+              <a:rPr lang="en-US" sz="1600" dirty="0">
+                <a:solidFill>
+                  <a:schemeClr val="accent1"/>
+                </a:solidFill>
+              </a:rPr>
+              <a:t>S2</a:t>
+            </a:r>
+          </a:p>
+        </p:txBody>
+      </p:sp>
+      <p:sp>
+        <p:nvSpPr>
+          <p:cNvPr id="60" name="TextBox 59">
+            <a:extLst>
+              <a:ext uri="{FF2B5EF4-FFF2-40B4-BE49-F238E27FC236}">
+                <a16:creationId xmlns:a16="http://schemas.microsoft.com/office/drawing/2014/main" id="{BB0F0D35-AF1C-0341-AE38-7C0900D897DB}"/>
+              </a:ext>
+            </a:extLst>
+          </p:cNvPr>
+          <p:cNvSpPr txBox="1"/>
+          <p:nvPr/>
+        </p:nvSpPr>
+        <p:spPr>
+          <a:xfrm>
+            <a:off x="2826186" y="4656183"/>
+            <a:ext cx="383438" cy="338554"/>
+          </a:xfrm>
+          <a:prstGeom prst="rect">
+            <a:avLst/>
+          </a:prstGeom>
+          <a:noFill/>
+        </p:spPr>
+        <p:txBody>
+          <a:bodyPr wrap="none" rtlCol="0">
+            <a:spAutoFit/>
+          </a:bodyPr>
+          <a:lstStyle/>
+          <a:p>
+            <a:r>
+              <a:rPr lang="en-US" sz="1600" dirty="0">
+                <a:solidFill>
+                  <a:schemeClr val="accent1"/>
+                </a:solidFill>
+              </a:rPr>
+              <a:t>S3</a:t>
+            </a:r>
+          </a:p>
+        </p:txBody>
+      </p:sp>
+      <p:sp>
+        <p:nvSpPr>
+          <p:cNvPr id="61" name="Title 60">
+            <a:extLst>
+              <a:ext uri="{FF2B5EF4-FFF2-40B4-BE49-F238E27FC236}">
+                <a16:creationId xmlns:a16="http://schemas.microsoft.com/office/drawing/2014/main" id="{DADF2D13-A876-6641-BA55-9D7873F9FACF}"/>
+              </a:ext>
+            </a:extLst>
+          </p:cNvPr>
+          <p:cNvSpPr>
+            <a:spLocks noGrp="1"/>
+          </p:cNvSpPr>
+          <p:nvPr>
+            <p:ph type="title"/>
+          </p:nvPr>
+        </p:nvSpPr>
+        <p:spPr>
+          <a:xfrm>
+            <a:off x="722996" y="365125"/>
+            <a:ext cx="10630804" cy="357173"/>
+          </a:xfrm>
+        </p:spPr>
+        <p:txBody>
+          <a:bodyPr>
+            <a:noAutofit/>
+          </a:bodyPr>
+          <a:lstStyle/>
+          <a:p>
+            <a:r>
+              <a:rPr lang="en-US" sz="2400"/>
+              <a:t>Clustering first</a:t>
+            </a:r>
+            <a:endParaRPr lang="en-US" sz="2400" dirty="0"/>
+          </a:p>
+        </p:txBody>
+      </p:sp>
+      <p:sp>
+        <p:nvSpPr>
+          <p:cNvPr id="62" name="TextBox 61">
+            <a:extLst>
+              <a:ext uri="{FF2B5EF4-FFF2-40B4-BE49-F238E27FC236}">
+                <a16:creationId xmlns:a16="http://schemas.microsoft.com/office/drawing/2014/main" id="{8E8E8D28-B622-E745-906E-881818BCD69E}"/>
+              </a:ext>
+            </a:extLst>
+          </p:cNvPr>
+          <p:cNvSpPr txBox="1"/>
+          <p:nvPr/>
+        </p:nvSpPr>
+        <p:spPr>
+          <a:xfrm>
+            <a:off x="3727980" y="6460903"/>
+            <a:ext cx="4736040" cy="369332"/>
+          </a:xfrm>
+          <a:prstGeom prst="rect">
+            <a:avLst/>
+          </a:prstGeom>
+          <a:noFill/>
+        </p:spPr>
+        <p:txBody>
+          <a:bodyPr wrap="none" rtlCol="0">
+            <a:spAutoFit/>
+          </a:bodyPr>
+          <a:lstStyle/>
+          <a:p>
+            <a:pPr algn="ctr"/>
+            <a:r>
+              <a:rPr lang="en-US" dirty="0"/>
+              <a:t>Simulated data: 100 variants total, 10 per cluster</a:t>
+            </a:r>
+          </a:p>
+        </p:txBody>
+      </p:sp>
       <p:pic>
         <p:nvPicPr>
-          <p:cNvPr id="2" name="Picture 1">
-            <a:extLst>
-              <a:ext uri="{FF2B5EF4-FFF2-40B4-BE49-F238E27FC236}">
-                <a16:creationId xmlns:a16="http://schemas.microsoft.com/office/drawing/2014/main" id="{16878474-67E9-C441-8B7C-BA6FCBB0F528}"/>
+          <p:cNvPr id="4" name="Picture 3">
+            <a:extLst>
+              <a:ext uri="{FF2B5EF4-FFF2-40B4-BE49-F238E27FC236}">
+                <a16:creationId xmlns:a16="http://schemas.microsoft.com/office/drawing/2014/main" id="{572ACFF8-A8E0-5D46-ADC3-5CF975E666A4}"/>
               </a:ext>
             </a:extLst>
           </p:cNvPr>
@@ -5669,1485 +7142,14 @@
         </p:blipFill>
         <p:spPr>
           <a:xfrm>
-            <a:off x="4934164" y="987713"/>
-            <a:ext cx="7263206" cy="4882573"/>
+            <a:off x="0" y="927266"/>
+            <a:ext cx="12192000" cy="5225143"/>
           </a:xfrm>
           <a:prstGeom prst="rect">
             <a:avLst/>
           </a:prstGeom>
         </p:spPr>
       </p:pic>
-      <p:sp>
-        <p:nvSpPr>
-          <p:cNvPr id="32" name="Oval 31">
-            <a:extLst>
-              <a:ext uri="{FF2B5EF4-FFF2-40B4-BE49-F238E27FC236}">
-                <a16:creationId xmlns:a16="http://schemas.microsoft.com/office/drawing/2014/main" id="{76AAB362-BB57-964F-BE7E-DCC3214D8B9E}"/>
-              </a:ext>
-            </a:extLst>
-          </p:cNvPr>
-          <p:cNvSpPr/>
-          <p:nvPr/>
-        </p:nvSpPr>
-        <p:spPr>
-          <a:xfrm>
-            <a:off x="2534097" y="1482078"/>
-            <a:ext cx="493160" cy="493160"/>
-          </a:xfrm>
-          <a:prstGeom prst="ellipse">
-            <a:avLst/>
-          </a:prstGeom>
-          <a:noFill/>
-          <a:ln>
-            <a:solidFill>
-              <a:schemeClr val="tx1"/>
-            </a:solidFill>
-          </a:ln>
-        </p:spPr>
-        <p:style>
-          <a:lnRef idx="2">
-            <a:schemeClr val="accent1">
-              <a:shade val="50000"/>
-            </a:schemeClr>
-          </a:lnRef>
-          <a:fillRef idx="1">
-            <a:schemeClr val="accent1"/>
-          </a:fillRef>
-          <a:effectRef idx="0">
-            <a:schemeClr val="accent1"/>
-          </a:effectRef>
-          <a:fontRef idx="minor">
-            <a:schemeClr val="lt1"/>
-          </a:fontRef>
-        </p:style>
-        <p:txBody>
-          <a:bodyPr rtlCol="0" anchor="ctr"/>
-          <a:lstStyle/>
-          <a:p>
-            <a:pPr algn="ctr"/>
-            <a:r>
-              <a:rPr lang="en-US" dirty="0">
-                <a:solidFill>
-                  <a:schemeClr val="tx1"/>
-                </a:solidFill>
-              </a:rPr>
-              <a:t>1</a:t>
-            </a:r>
-          </a:p>
-        </p:txBody>
-      </p:sp>
-      <p:sp>
-        <p:nvSpPr>
-          <p:cNvPr id="33" name="Oval 32">
-            <a:extLst>
-              <a:ext uri="{FF2B5EF4-FFF2-40B4-BE49-F238E27FC236}">
-                <a16:creationId xmlns:a16="http://schemas.microsoft.com/office/drawing/2014/main" id="{7655B9DE-335F-D34C-BDD6-3F5EB1ECCABC}"/>
-              </a:ext>
-            </a:extLst>
-          </p:cNvPr>
-          <p:cNvSpPr/>
-          <p:nvPr/>
-        </p:nvSpPr>
-        <p:spPr>
-          <a:xfrm>
-            <a:off x="2534097" y="2240653"/>
-            <a:ext cx="493160" cy="493160"/>
-          </a:xfrm>
-          <a:prstGeom prst="ellipse">
-            <a:avLst/>
-          </a:prstGeom>
-          <a:noFill/>
-          <a:ln>
-            <a:solidFill>
-              <a:schemeClr val="tx1"/>
-            </a:solidFill>
-          </a:ln>
-        </p:spPr>
-        <p:style>
-          <a:lnRef idx="2">
-            <a:schemeClr val="accent1">
-              <a:shade val="50000"/>
-            </a:schemeClr>
-          </a:lnRef>
-          <a:fillRef idx="1">
-            <a:schemeClr val="accent1"/>
-          </a:fillRef>
-          <a:effectRef idx="0">
-            <a:schemeClr val="accent1"/>
-          </a:effectRef>
-          <a:fontRef idx="minor">
-            <a:schemeClr val="lt1"/>
-          </a:fontRef>
-        </p:style>
-        <p:txBody>
-          <a:bodyPr rtlCol="0" anchor="ctr"/>
-          <a:lstStyle/>
-          <a:p>
-            <a:pPr algn="ctr"/>
-            <a:r>
-              <a:rPr lang="en-US" dirty="0">
-                <a:solidFill>
-                  <a:schemeClr val="tx1"/>
-                </a:solidFill>
-              </a:rPr>
-              <a:t>2</a:t>
-            </a:r>
-          </a:p>
-        </p:txBody>
-      </p:sp>
-      <p:sp>
-        <p:nvSpPr>
-          <p:cNvPr id="34" name="Oval 33">
-            <a:extLst>
-              <a:ext uri="{FF2B5EF4-FFF2-40B4-BE49-F238E27FC236}">
-                <a16:creationId xmlns:a16="http://schemas.microsoft.com/office/drawing/2014/main" id="{903CD4F1-6ADC-374B-A71B-5B9A284FC46F}"/>
-              </a:ext>
-            </a:extLst>
-          </p:cNvPr>
-          <p:cNvSpPr/>
-          <p:nvPr/>
-        </p:nvSpPr>
-        <p:spPr>
-          <a:xfrm>
-            <a:off x="1619697" y="3196151"/>
-            <a:ext cx="493160" cy="493160"/>
-          </a:xfrm>
-          <a:prstGeom prst="ellipse">
-            <a:avLst/>
-          </a:prstGeom>
-          <a:noFill/>
-          <a:ln>
-            <a:solidFill>
-              <a:schemeClr val="tx1"/>
-            </a:solidFill>
-          </a:ln>
-        </p:spPr>
-        <p:style>
-          <a:lnRef idx="2">
-            <a:schemeClr val="accent1">
-              <a:shade val="50000"/>
-            </a:schemeClr>
-          </a:lnRef>
-          <a:fillRef idx="1">
-            <a:schemeClr val="accent1"/>
-          </a:fillRef>
-          <a:effectRef idx="0">
-            <a:schemeClr val="accent1"/>
-          </a:effectRef>
-          <a:fontRef idx="minor">
-            <a:schemeClr val="lt1"/>
-          </a:fontRef>
-        </p:style>
-        <p:txBody>
-          <a:bodyPr rtlCol="0" anchor="ctr"/>
-          <a:lstStyle/>
-          <a:p>
-            <a:pPr algn="ctr"/>
-            <a:r>
-              <a:rPr lang="en-US" dirty="0">
-                <a:solidFill>
-                  <a:schemeClr val="tx1"/>
-                </a:solidFill>
-              </a:rPr>
-              <a:t>3</a:t>
-            </a:r>
-          </a:p>
-        </p:txBody>
-      </p:sp>
-      <p:sp>
-        <p:nvSpPr>
-          <p:cNvPr id="35" name="Oval 34">
-            <a:extLst>
-              <a:ext uri="{FF2B5EF4-FFF2-40B4-BE49-F238E27FC236}">
-                <a16:creationId xmlns:a16="http://schemas.microsoft.com/office/drawing/2014/main" id="{0DE64844-DF82-5F4B-8930-F9E875C42758}"/>
-              </a:ext>
-            </a:extLst>
-          </p:cNvPr>
-          <p:cNvSpPr/>
-          <p:nvPr/>
-        </p:nvSpPr>
-        <p:spPr>
-          <a:xfrm>
-            <a:off x="3314934" y="3196151"/>
-            <a:ext cx="493160" cy="493160"/>
-          </a:xfrm>
-          <a:prstGeom prst="ellipse">
-            <a:avLst/>
-          </a:prstGeom>
-          <a:noFill/>
-          <a:ln>
-            <a:solidFill>
-              <a:schemeClr val="tx1"/>
-            </a:solidFill>
-          </a:ln>
-        </p:spPr>
-        <p:style>
-          <a:lnRef idx="2">
-            <a:schemeClr val="accent1">
-              <a:shade val="50000"/>
-            </a:schemeClr>
-          </a:lnRef>
-          <a:fillRef idx="1">
-            <a:schemeClr val="accent1"/>
-          </a:fillRef>
-          <a:effectRef idx="0">
-            <a:schemeClr val="accent1"/>
-          </a:effectRef>
-          <a:fontRef idx="minor">
-            <a:schemeClr val="lt1"/>
-          </a:fontRef>
-        </p:style>
-        <p:txBody>
-          <a:bodyPr rtlCol="0" anchor="ctr"/>
-          <a:lstStyle/>
-          <a:p>
-            <a:pPr algn="ctr"/>
-            <a:r>
-              <a:rPr lang="en-US" dirty="0">
-                <a:solidFill>
-                  <a:schemeClr val="tx1"/>
-                </a:solidFill>
-              </a:rPr>
-              <a:t>6</a:t>
-            </a:r>
-          </a:p>
-        </p:txBody>
-      </p:sp>
-      <p:sp>
-        <p:nvSpPr>
-          <p:cNvPr id="36" name="Oval 35">
-            <a:extLst>
-              <a:ext uri="{FF2B5EF4-FFF2-40B4-BE49-F238E27FC236}">
-                <a16:creationId xmlns:a16="http://schemas.microsoft.com/office/drawing/2014/main" id="{FC732AAA-1D7C-FE4C-A4F3-6F49F2B9128B}"/>
-              </a:ext>
-            </a:extLst>
-          </p:cNvPr>
-          <p:cNvSpPr/>
-          <p:nvPr/>
-        </p:nvSpPr>
-        <p:spPr>
-          <a:xfrm>
-            <a:off x="3314934" y="3976129"/>
-            <a:ext cx="493160" cy="493160"/>
-          </a:xfrm>
-          <a:prstGeom prst="ellipse">
-            <a:avLst/>
-          </a:prstGeom>
-          <a:noFill/>
-          <a:ln>
-            <a:solidFill>
-              <a:schemeClr val="tx1"/>
-            </a:solidFill>
-          </a:ln>
-        </p:spPr>
-        <p:style>
-          <a:lnRef idx="2">
-            <a:schemeClr val="accent1">
-              <a:shade val="50000"/>
-            </a:schemeClr>
-          </a:lnRef>
-          <a:fillRef idx="1">
-            <a:schemeClr val="accent1"/>
-          </a:fillRef>
-          <a:effectRef idx="0">
-            <a:schemeClr val="accent1"/>
-          </a:effectRef>
-          <a:fontRef idx="minor">
-            <a:schemeClr val="lt1"/>
-          </a:fontRef>
-        </p:style>
-        <p:txBody>
-          <a:bodyPr rtlCol="0" anchor="ctr"/>
-          <a:lstStyle/>
-          <a:p>
-            <a:pPr algn="ctr"/>
-            <a:r>
-              <a:rPr lang="en-US" dirty="0">
-                <a:solidFill>
-                  <a:schemeClr val="tx1"/>
-                </a:solidFill>
-              </a:rPr>
-              <a:t>7</a:t>
-            </a:r>
-          </a:p>
-        </p:txBody>
-      </p:sp>
-      <p:sp>
-        <p:nvSpPr>
-          <p:cNvPr id="37" name="Oval 36">
-            <a:extLst>
-              <a:ext uri="{FF2B5EF4-FFF2-40B4-BE49-F238E27FC236}">
-                <a16:creationId xmlns:a16="http://schemas.microsoft.com/office/drawing/2014/main" id="{70C22177-D46E-1149-8BDD-48FA0C0AFB3F}"/>
-              </a:ext>
-            </a:extLst>
-          </p:cNvPr>
-          <p:cNvSpPr/>
-          <p:nvPr/>
-        </p:nvSpPr>
-        <p:spPr>
-          <a:xfrm>
-            <a:off x="1126537" y="3976129"/>
-            <a:ext cx="493160" cy="493160"/>
-          </a:xfrm>
-          <a:prstGeom prst="ellipse">
-            <a:avLst/>
-          </a:prstGeom>
-          <a:noFill/>
-          <a:ln>
-            <a:solidFill>
-              <a:schemeClr val="tx1"/>
-            </a:solidFill>
-          </a:ln>
-        </p:spPr>
-        <p:style>
-          <a:lnRef idx="2">
-            <a:schemeClr val="accent1">
-              <a:shade val="50000"/>
-            </a:schemeClr>
-          </a:lnRef>
-          <a:fillRef idx="1">
-            <a:schemeClr val="accent1"/>
-          </a:fillRef>
-          <a:effectRef idx="0">
-            <a:schemeClr val="accent1"/>
-          </a:effectRef>
-          <a:fontRef idx="minor">
-            <a:schemeClr val="lt1"/>
-          </a:fontRef>
-        </p:style>
-        <p:txBody>
-          <a:bodyPr rtlCol="0" anchor="ctr"/>
-          <a:lstStyle/>
-          <a:p>
-            <a:pPr algn="ctr"/>
-            <a:r>
-              <a:rPr lang="en-US" dirty="0">
-                <a:solidFill>
-                  <a:schemeClr val="tx1"/>
-                </a:solidFill>
-              </a:rPr>
-              <a:t>4</a:t>
-            </a:r>
-          </a:p>
-        </p:txBody>
-      </p:sp>
-      <p:sp>
-        <p:nvSpPr>
-          <p:cNvPr id="38" name="Oval 37">
-            <a:extLst>
-              <a:ext uri="{FF2B5EF4-FFF2-40B4-BE49-F238E27FC236}">
-                <a16:creationId xmlns:a16="http://schemas.microsoft.com/office/drawing/2014/main" id="{1627EC68-ED1E-CF44-9700-29DDB8674744}"/>
-              </a:ext>
-            </a:extLst>
-          </p:cNvPr>
-          <p:cNvSpPr/>
-          <p:nvPr/>
-        </p:nvSpPr>
-        <p:spPr>
-          <a:xfrm>
-            <a:off x="2040937" y="3976129"/>
-            <a:ext cx="493160" cy="493160"/>
-          </a:xfrm>
-          <a:prstGeom prst="ellipse">
-            <a:avLst/>
-          </a:prstGeom>
-          <a:noFill/>
-          <a:ln>
-            <a:solidFill>
-              <a:schemeClr val="tx1"/>
-            </a:solidFill>
-          </a:ln>
-        </p:spPr>
-        <p:style>
-          <a:lnRef idx="2">
-            <a:schemeClr val="accent1">
-              <a:shade val="50000"/>
-            </a:schemeClr>
-          </a:lnRef>
-          <a:fillRef idx="1">
-            <a:schemeClr val="accent1"/>
-          </a:fillRef>
-          <a:effectRef idx="0">
-            <a:schemeClr val="accent1"/>
-          </a:effectRef>
-          <a:fontRef idx="minor">
-            <a:schemeClr val="lt1"/>
-          </a:fontRef>
-        </p:style>
-        <p:txBody>
-          <a:bodyPr rtlCol="0" anchor="ctr"/>
-          <a:lstStyle/>
-          <a:p>
-            <a:pPr algn="ctr"/>
-            <a:r>
-              <a:rPr lang="en-US" dirty="0">
-                <a:solidFill>
-                  <a:schemeClr val="tx1"/>
-                </a:solidFill>
-              </a:rPr>
-              <a:t>5</a:t>
-            </a:r>
-          </a:p>
-        </p:txBody>
-      </p:sp>
-      <p:sp>
-        <p:nvSpPr>
-          <p:cNvPr id="39" name="Oval 38">
-            <a:extLst>
-              <a:ext uri="{FF2B5EF4-FFF2-40B4-BE49-F238E27FC236}">
-                <a16:creationId xmlns:a16="http://schemas.microsoft.com/office/drawing/2014/main" id="{AD0B9982-444D-3B4B-B14B-998BF829E730}"/>
-              </a:ext>
-            </a:extLst>
-          </p:cNvPr>
-          <p:cNvSpPr/>
-          <p:nvPr/>
-        </p:nvSpPr>
-        <p:spPr>
-          <a:xfrm>
-            <a:off x="1126537" y="4931627"/>
-            <a:ext cx="493160" cy="493160"/>
-          </a:xfrm>
-          <a:prstGeom prst="ellipse">
-            <a:avLst/>
-          </a:prstGeom>
-          <a:noFill/>
-          <a:ln>
-            <a:solidFill>
-              <a:schemeClr val="tx1"/>
-            </a:solidFill>
-          </a:ln>
-        </p:spPr>
-        <p:style>
-          <a:lnRef idx="2">
-            <a:schemeClr val="accent1">
-              <a:shade val="50000"/>
-            </a:schemeClr>
-          </a:lnRef>
-          <a:fillRef idx="1">
-            <a:schemeClr val="accent1"/>
-          </a:fillRef>
-          <a:effectRef idx="0">
-            <a:schemeClr val="accent1"/>
-          </a:effectRef>
-          <a:fontRef idx="minor">
-            <a:schemeClr val="lt1"/>
-          </a:fontRef>
-        </p:style>
-        <p:txBody>
-          <a:bodyPr rtlCol="0" anchor="ctr"/>
-          <a:lstStyle/>
-          <a:p>
-            <a:pPr algn="ctr"/>
-            <a:r>
-              <a:rPr lang="en-US" dirty="0">
-                <a:solidFill>
-                  <a:schemeClr val="tx1"/>
-                </a:solidFill>
-              </a:rPr>
-              <a:t>8</a:t>
-            </a:r>
-          </a:p>
-        </p:txBody>
-      </p:sp>
-      <p:sp>
-        <p:nvSpPr>
-          <p:cNvPr id="40" name="Oval 39">
-            <a:extLst>
-              <a:ext uri="{FF2B5EF4-FFF2-40B4-BE49-F238E27FC236}">
-                <a16:creationId xmlns:a16="http://schemas.microsoft.com/office/drawing/2014/main" id="{6EBF18CB-EF70-7746-82DB-CF95FB5A106A}"/>
-              </a:ext>
-            </a:extLst>
-          </p:cNvPr>
-          <p:cNvSpPr/>
-          <p:nvPr/>
-        </p:nvSpPr>
-        <p:spPr>
-          <a:xfrm>
-            <a:off x="2040937" y="4931627"/>
-            <a:ext cx="493160" cy="493160"/>
-          </a:xfrm>
-          <a:prstGeom prst="ellipse">
-            <a:avLst/>
-          </a:prstGeom>
-          <a:noFill/>
-          <a:ln>
-            <a:solidFill>
-              <a:schemeClr val="tx1"/>
-            </a:solidFill>
-          </a:ln>
-        </p:spPr>
-        <p:style>
-          <a:lnRef idx="2">
-            <a:schemeClr val="accent1">
-              <a:shade val="50000"/>
-            </a:schemeClr>
-          </a:lnRef>
-          <a:fillRef idx="1">
-            <a:schemeClr val="accent1"/>
-          </a:fillRef>
-          <a:effectRef idx="0">
-            <a:schemeClr val="accent1"/>
-          </a:effectRef>
-          <a:fontRef idx="minor">
-            <a:schemeClr val="lt1"/>
-          </a:fontRef>
-        </p:style>
-        <p:txBody>
-          <a:bodyPr rtlCol="0" anchor="ctr"/>
-          <a:lstStyle/>
-          <a:p>
-            <a:pPr algn="ctr"/>
-            <a:r>
-              <a:rPr lang="en-US" dirty="0">
-                <a:solidFill>
-                  <a:schemeClr val="tx1"/>
-                </a:solidFill>
-              </a:rPr>
-              <a:t>9</a:t>
-            </a:r>
-          </a:p>
-        </p:txBody>
-      </p:sp>
-      <p:sp>
-        <p:nvSpPr>
-          <p:cNvPr id="41" name="Oval 40">
-            <a:extLst>
-              <a:ext uri="{FF2B5EF4-FFF2-40B4-BE49-F238E27FC236}">
-                <a16:creationId xmlns:a16="http://schemas.microsoft.com/office/drawing/2014/main" id="{5DD254CB-A2FA-CB4C-B4FB-2E49363FED0D}"/>
-              </a:ext>
-            </a:extLst>
-          </p:cNvPr>
-          <p:cNvSpPr/>
-          <p:nvPr/>
-        </p:nvSpPr>
-        <p:spPr>
-          <a:xfrm>
-            <a:off x="3314933" y="4931627"/>
-            <a:ext cx="493160" cy="493160"/>
-          </a:xfrm>
-          <a:prstGeom prst="ellipse">
-            <a:avLst/>
-          </a:prstGeom>
-          <a:noFill/>
-          <a:ln>
-            <a:solidFill>
-              <a:schemeClr val="tx1"/>
-            </a:solidFill>
-          </a:ln>
-        </p:spPr>
-        <p:style>
-          <a:lnRef idx="2">
-            <a:schemeClr val="accent1">
-              <a:shade val="50000"/>
-            </a:schemeClr>
-          </a:lnRef>
-          <a:fillRef idx="1">
-            <a:schemeClr val="accent1"/>
-          </a:fillRef>
-          <a:effectRef idx="0">
-            <a:schemeClr val="accent1"/>
-          </a:effectRef>
-          <a:fontRef idx="minor">
-            <a:schemeClr val="lt1"/>
-          </a:fontRef>
-        </p:style>
-        <p:txBody>
-          <a:bodyPr rtlCol="0" anchor="ctr"/>
-          <a:lstStyle/>
-          <a:p>
-            <a:pPr algn="ctr"/>
-            <a:r>
-              <a:rPr lang="en-US" sz="1200" dirty="0">
-                <a:solidFill>
-                  <a:schemeClr val="tx1"/>
-                </a:solidFill>
-              </a:rPr>
-              <a:t>10</a:t>
-            </a:r>
-          </a:p>
-        </p:txBody>
-      </p:sp>
-      <p:cxnSp>
-        <p:nvCxnSpPr>
-          <p:cNvPr id="42" name="Straight Arrow Connector 41">
-            <a:extLst>
-              <a:ext uri="{FF2B5EF4-FFF2-40B4-BE49-F238E27FC236}">
-                <a16:creationId xmlns:a16="http://schemas.microsoft.com/office/drawing/2014/main" id="{5D377682-BF0E-3849-9862-A34A9122DE7C}"/>
-              </a:ext>
-            </a:extLst>
-          </p:cNvPr>
-          <p:cNvCxnSpPr>
-            <a:stCxn id="35" idx="4"/>
-            <a:endCxn id="36" idx="0"/>
-          </p:cNvCxnSpPr>
-          <p:nvPr/>
-        </p:nvCxnSpPr>
-        <p:spPr>
-          <a:xfrm>
-            <a:off x="3561514" y="3689311"/>
-            <a:ext cx="0" cy="286818"/>
-          </a:xfrm>
-          <a:prstGeom prst="straightConnector1">
-            <a:avLst/>
-          </a:prstGeom>
-          <a:ln>
-            <a:solidFill>
-              <a:schemeClr val="tx1"/>
-            </a:solidFill>
-            <a:tailEnd type="triangle"/>
-          </a:ln>
-        </p:spPr>
-        <p:style>
-          <a:lnRef idx="1">
-            <a:schemeClr val="accent1"/>
-          </a:lnRef>
-          <a:fillRef idx="0">
-            <a:schemeClr val="accent1"/>
-          </a:fillRef>
-          <a:effectRef idx="0">
-            <a:schemeClr val="accent1"/>
-          </a:effectRef>
-          <a:fontRef idx="minor">
-            <a:schemeClr val="tx1"/>
-          </a:fontRef>
-        </p:style>
-      </p:cxnSp>
-      <p:cxnSp>
-        <p:nvCxnSpPr>
-          <p:cNvPr id="43" name="Straight Arrow Connector 42">
-            <a:extLst>
-              <a:ext uri="{FF2B5EF4-FFF2-40B4-BE49-F238E27FC236}">
-                <a16:creationId xmlns:a16="http://schemas.microsoft.com/office/drawing/2014/main" id="{3C2FC4B9-7A23-2B48-9AFA-D27C49B79225}"/>
-              </a:ext>
-            </a:extLst>
-          </p:cNvPr>
-          <p:cNvCxnSpPr>
-            <a:cxnSpLocks/>
-            <a:stCxn id="36" idx="4"/>
-            <a:endCxn id="41" idx="0"/>
-          </p:cNvCxnSpPr>
-          <p:nvPr/>
-        </p:nvCxnSpPr>
-        <p:spPr>
-          <a:xfrm flipH="1">
-            <a:off x="3561513" y="4469289"/>
-            <a:ext cx="1" cy="462338"/>
-          </a:xfrm>
-          <a:prstGeom prst="straightConnector1">
-            <a:avLst/>
-          </a:prstGeom>
-          <a:ln>
-            <a:solidFill>
-              <a:schemeClr val="tx1"/>
-            </a:solidFill>
-            <a:tailEnd type="triangle"/>
-          </a:ln>
-        </p:spPr>
-        <p:style>
-          <a:lnRef idx="1">
-            <a:schemeClr val="accent1"/>
-          </a:lnRef>
-          <a:fillRef idx="0">
-            <a:schemeClr val="accent1"/>
-          </a:fillRef>
-          <a:effectRef idx="0">
-            <a:schemeClr val="accent1"/>
-          </a:effectRef>
-          <a:fontRef idx="minor">
-            <a:schemeClr val="tx1"/>
-          </a:fontRef>
-        </p:style>
-      </p:cxnSp>
-      <p:cxnSp>
-        <p:nvCxnSpPr>
-          <p:cNvPr id="44" name="Straight Arrow Connector 43">
-            <a:extLst>
-              <a:ext uri="{FF2B5EF4-FFF2-40B4-BE49-F238E27FC236}">
-                <a16:creationId xmlns:a16="http://schemas.microsoft.com/office/drawing/2014/main" id="{36CB5BB8-63CB-514C-A0F1-763A0FB2B74E}"/>
-              </a:ext>
-            </a:extLst>
-          </p:cNvPr>
-          <p:cNvCxnSpPr>
-            <a:cxnSpLocks/>
-            <a:stCxn id="38" idx="4"/>
-            <a:endCxn id="40" idx="0"/>
-          </p:cNvCxnSpPr>
-          <p:nvPr/>
-        </p:nvCxnSpPr>
-        <p:spPr>
-          <a:xfrm>
-            <a:off x="2287517" y="4469289"/>
-            <a:ext cx="0" cy="462338"/>
-          </a:xfrm>
-          <a:prstGeom prst="straightConnector1">
-            <a:avLst/>
-          </a:prstGeom>
-          <a:ln>
-            <a:solidFill>
-              <a:schemeClr val="tx1"/>
-            </a:solidFill>
-            <a:tailEnd type="triangle"/>
-          </a:ln>
-        </p:spPr>
-        <p:style>
-          <a:lnRef idx="1">
-            <a:schemeClr val="accent1"/>
-          </a:lnRef>
-          <a:fillRef idx="0">
-            <a:schemeClr val="accent1"/>
-          </a:fillRef>
-          <a:effectRef idx="0">
-            <a:schemeClr val="accent1"/>
-          </a:effectRef>
-          <a:fontRef idx="minor">
-            <a:schemeClr val="tx1"/>
-          </a:fontRef>
-        </p:style>
-      </p:cxnSp>
-      <p:cxnSp>
-        <p:nvCxnSpPr>
-          <p:cNvPr id="45" name="Straight Arrow Connector 44">
-            <a:extLst>
-              <a:ext uri="{FF2B5EF4-FFF2-40B4-BE49-F238E27FC236}">
-                <a16:creationId xmlns:a16="http://schemas.microsoft.com/office/drawing/2014/main" id="{61162574-D778-C545-93F0-66AAA771A921}"/>
-              </a:ext>
-            </a:extLst>
-          </p:cNvPr>
-          <p:cNvCxnSpPr>
-            <a:cxnSpLocks/>
-            <a:stCxn id="34" idx="4"/>
-            <a:endCxn id="38" idx="0"/>
-          </p:cNvCxnSpPr>
-          <p:nvPr/>
-        </p:nvCxnSpPr>
-        <p:spPr>
-          <a:xfrm>
-            <a:off x="1866277" y="3689311"/>
-            <a:ext cx="421240" cy="286818"/>
-          </a:xfrm>
-          <a:prstGeom prst="straightConnector1">
-            <a:avLst/>
-          </a:prstGeom>
-          <a:ln>
-            <a:solidFill>
-              <a:schemeClr val="tx1"/>
-            </a:solidFill>
-            <a:tailEnd type="triangle"/>
-          </a:ln>
-        </p:spPr>
-        <p:style>
-          <a:lnRef idx="1">
-            <a:schemeClr val="accent1"/>
-          </a:lnRef>
-          <a:fillRef idx="0">
-            <a:schemeClr val="accent1"/>
-          </a:fillRef>
-          <a:effectRef idx="0">
-            <a:schemeClr val="accent1"/>
-          </a:effectRef>
-          <a:fontRef idx="minor">
-            <a:schemeClr val="tx1"/>
-          </a:fontRef>
-        </p:style>
-      </p:cxnSp>
-      <p:cxnSp>
-        <p:nvCxnSpPr>
-          <p:cNvPr id="46" name="Straight Arrow Connector 45">
-            <a:extLst>
-              <a:ext uri="{FF2B5EF4-FFF2-40B4-BE49-F238E27FC236}">
-                <a16:creationId xmlns:a16="http://schemas.microsoft.com/office/drawing/2014/main" id="{1FCBC232-D0C0-6B42-97BB-515250AE6138}"/>
-              </a:ext>
-            </a:extLst>
-          </p:cNvPr>
-          <p:cNvCxnSpPr>
-            <a:cxnSpLocks/>
-            <a:stCxn id="34" idx="4"/>
-            <a:endCxn id="37" idx="0"/>
-          </p:cNvCxnSpPr>
-          <p:nvPr/>
-        </p:nvCxnSpPr>
-        <p:spPr>
-          <a:xfrm flipH="1">
-            <a:off x="1373117" y="3689311"/>
-            <a:ext cx="493160" cy="286818"/>
-          </a:xfrm>
-          <a:prstGeom prst="straightConnector1">
-            <a:avLst/>
-          </a:prstGeom>
-          <a:ln>
-            <a:solidFill>
-              <a:schemeClr val="tx1"/>
-            </a:solidFill>
-            <a:tailEnd type="triangle"/>
-          </a:ln>
-        </p:spPr>
-        <p:style>
-          <a:lnRef idx="1">
-            <a:schemeClr val="accent1"/>
-          </a:lnRef>
-          <a:fillRef idx="0">
-            <a:schemeClr val="accent1"/>
-          </a:fillRef>
-          <a:effectRef idx="0">
-            <a:schemeClr val="accent1"/>
-          </a:effectRef>
-          <a:fontRef idx="minor">
-            <a:schemeClr val="tx1"/>
-          </a:fontRef>
-        </p:style>
-      </p:cxnSp>
-      <p:cxnSp>
-        <p:nvCxnSpPr>
-          <p:cNvPr id="47" name="Straight Arrow Connector 46">
-            <a:extLst>
-              <a:ext uri="{FF2B5EF4-FFF2-40B4-BE49-F238E27FC236}">
-                <a16:creationId xmlns:a16="http://schemas.microsoft.com/office/drawing/2014/main" id="{A1415F2B-99FF-AC4C-AEE7-D0CEBF63F70F}"/>
-              </a:ext>
-            </a:extLst>
-          </p:cNvPr>
-          <p:cNvCxnSpPr>
-            <a:cxnSpLocks/>
-            <a:stCxn id="37" idx="4"/>
-            <a:endCxn id="39" idx="0"/>
-          </p:cNvCxnSpPr>
-          <p:nvPr/>
-        </p:nvCxnSpPr>
-        <p:spPr>
-          <a:xfrm>
-            <a:off x="1373117" y="4469289"/>
-            <a:ext cx="0" cy="462338"/>
-          </a:xfrm>
-          <a:prstGeom prst="straightConnector1">
-            <a:avLst/>
-          </a:prstGeom>
-          <a:ln>
-            <a:solidFill>
-              <a:schemeClr val="tx1"/>
-            </a:solidFill>
-            <a:tailEnd type="triangle"/>
-          </a:ln>
-        </p:spPr>
-        <p:style>
-          <a:lnRef idx="1">
-            <a:schemeClr val="accent1"/>
-          </a:lnRef>
-          <a:fillRef idx="0">
-            <a:schemeClr val="accent1"/>
-          </a:fillRef>
-          <a:effectRef idx="0">
-            <a:schemeClr val="accent1"/>
-          </a:effectRef>
-          <a:fontRef idx="minor">
-            <a:schemeClr val="tx1"/>
-          </a:fontRef>
-        </p:style>
-      </p:cxnSp>
-      <p:cxnSp>
-        <p:nvCxnSpPr>
-          <p:cNvPr id="48" name="Straight Arrow Connector 47">
-            <a:extLst>
-              <a:ext uri="{FF2B5EF4-FFF2-40B4-BE49-F238E27FC236}">
-                <a16:creationId xmlns:a16="http://schemas.microsoft.com/office/drawing/2014/main" id="{0F112471-FB24-EC40-9576-2C9D7CBBA525}"/>
-              </a:ext>
-            </a:extLst>
-          </p:cNvPr>
-          <p:cNvCxnSpPr>
-            <a:cxnSpLocks/>
-            <a:stCxn id="32" idx="4"/>
-            <a:endCxn id="33" idx="0"/>
-          </p:cNvCxnSpPr>
-          <p:nvPr/>
-        </p:nvCxnSpPr>
-        <p:spPr>
-          <a:xfrm>
-            <a:off x="2780677" y="1975238"/>
-            <a:ext cx="0" cy="265415"/>
-          </a:xfrm>
-          <a:prstGeom prst="straightConnector1">
-            <a:avLst/>
-          </a:prstGeom>
-          <a:ln>
-            <a:solidFill>
-              <a:schemeClr val="tx1"/>
-            </a:solidFill>
-            <a:tailEnd type="triangle"/>
-          </a:ln>
-        </p:spPr>
-        <p:style>
-          <a:lnRef idx="1">
-            <a:schemeClr val="accent1"/>
-          </a:lnRef>
-          <a:fillRef idx="0">
-            <a:schemeClr val="accent1"/>
-          </a:fillRef>
-          <a:effectRef idx="0">
-            <a:schemeClr val="accent1"/>
-          </a:effectRef>
-          <a:fontRef idx="minor">
-            <a:schemeClr val="tx1"/>
-          </a:fontRef>
-        </p:style>
-      </p:cxnSp>
-      <p:cxnSp>
-        <p:nvCxnSpPr>
-          <p:cNvPr id="49" name="Straight Arrow Connector 48">
-            <a:extLst>
-              <a:ext uri="{FF2B5EF4-FFF2-40B4-BE49-F238E27FC236}">
-                <a16:creationId xmlns:a16="http://schemas.microsoft.com/office/drawing/2014/main" id="{0A9DFB7D-5BD8-D34E-8E6F-DEF553AA9D5B}"/>
-              </a:ext>
-            </a:extLst>
-          </p:cNvPr>
-          <p:cNvCxnSpPr>
-            <a:cxnSpLocks/>
-            <a:stCxn id="33" idx="4"/>
-            <a:endCxn id="35" idx="0"/>
-          </p:cNvCxnSpPr>
-          <p:nvPr/>
-        </p:nvCxnSpPr>
-        <p:spPr>
-          <a:xfrm>
-            <a:off x="2780677" y="2733813"/>
-            <a:ext cx="780837" cy="462338"/>
-          </a:xfrm>
-          <a:prstGeom prst="straightConnector1">
-            <a:avLst/>
-          </a:prstGeom>
-          <a:ln>
-            <a:solidFill>
-              <a:schemeClr val="tx1"/>
-            </a:solidFill>
-            <a:tailEnd type="triangle"/>
-          </a:ln>
-        </p:spPr>
-        <p:style>
-          <a:lnRef idx="1">
-            <a:schemeClr val="accent1"/>
-          </a:lnRef>
-          <a:fillRef idx="0">
-            <a:schemeClr val="accent1"/>
-          </a:fillRef>
-          <a:effectRef idx="0">
-            <a:schemeClr val="accent1"/>
-          </a:effectRef>
-          <a:fontRef idx="minor">
-            <a:schemeClr val="tx1"/>
-          </a:fontRef>
-        </p:style>
-      </p:cxnSp>
-      <p:cxnSp>
-        <p:nvCxnSpPr>
-          <p:cNvPr id="50" name="Straight Arrow Connector 49">
-            <a:extLst>
-              <a:ext uri="{FF2B5EF4-FFF2-40B4-BE49-F238E27FC236}">
-                <a16:creationId xmlns:a16="http://schemas.microsoft.com/office/drawing/2014/main" id="{1C8084B2-183F-5F4D-B95A-76E865E64857}"/>
-              </a:ext>
-            </a:extLst>
-          </p:cNvPr>
-          <p:cNvCxnSpPr>
-            <a:cxnSpLocks/>
-            <a:stCxn id="33" idx="4"/>
-            <a:endCxn id="34" idx="0"/>
-          </p:cNvCxnSpPr>
-          <p:nvPr/>
-        </p:nvCxnSpPr>
-        <p:spPr>
-          <a:xfrm flipH="1">
-            <a:off x="1866277" y="2733813"/>
-            <a:ext cx="914400" cy="462338"/>
-          </a:xfrm>
-          <a:prstGeom prst="straightConnector1">
-            <a:avLst/>
-          </a:prstGeom>
-          <a:ln>
-            <a:solidFill>
-              <a:schemeClr val="tx1"/>
-            </a:solidFill>
-            <a:tailEnd type="triangle"/>
-          </a:ln>
-        </p:spPr>
-        <p:style>
-          <a:lnRef idx="1">
-            <a:schemeClr val="accent1"/>
-          </a:lnRef>
-          <a:fillRef idx="0">
-            <a:schemeClr val="accent1"/>
-          </a:fillRef>
-          <a:effectRef idx="0">
-            <a:schemeClr val="accent1"/>
-          </a:effectRef>
-          <a:fontRef idx="minor">
-            <a:schemeClr val="tx1"/>
-          </a:fontRef>
-        </p:style>
-      </p:cxnSp>
-      <p:cxnSp>
-        <p:nvCxnSpPr>
-          <p:cNvPr id="51" name="Straight Connector 50">
-            <a:extLst>
-              <a:ext uri="{FF2B5EF4-FFF2-40B4-BE49-F238E27FC236}">
-                <a16:creationId xmlns:a16="http://schemas.microsoft.com/office/drawing/2014/main" id="{308E64B6-552E-4F49-8D5E-9EFF019542EB}"/>
-              </a:ext>
-            </a:extLst>
-          </p:cNvPr>
-          <p:cNvCxnSpPr>
-            <a:cxnSpLocks/>
-          </p:cNvCxnSpPr>
-          <p:nvPr/>
-        </p:nvCxnSpPr>
-        <p:spPr>
-          <a:xfrm>
-            <a:off x="766944" y="2910187"/>
-            <a:ext cx="3493213" cy="0"/>
-          </a:xfrm>
-          <a:prstGeom prst="line">
-            <a:avLst/>
-          </a:prstGeom>
-          <a:ln>
-            <a:prstDash val="dash"/>
-          </a:ln>
-        </p:spPr>
-        <p:style>
-          <a:lnRef idx="1">
-            <a:schemeClr val="accent1"/>
-          </a:lnRef>
-          <a:fillRef idx="0">
-            <a:schemeClr val="accent1"/>
-          </a:fillRef>
-          <a:effectRef idx="0">
-            <a:schemeClr val="accent1"/>
-          </a:effectRef>
-          <a:fontRef idx="minor">
-            <a:schemeClr val="tx1"/>
-          </a:fontRef>
-        </p:style>
-      </p:cxnSp>
-      <p:cxnSp>
-        <p:nvCxnSpPr>
-          <p:cNvPr id="52" name="Straight Connector 51">
-            <a:extLst>
-              <a:ext uri="{FF2B5EF4-FFF2-40B4-BE49-F238E27FC236}">
-                <a16:creationId xmlns:a16="http://schemas.microsoft.com/office/drawing/2014/main" id="{B29E0569-1325-C24A-ACAB-15E36E2068E7}"/>
-              </a:ext>
-            </a:extLst>
-          </p:cNvPr>
-          <p:cNvCxnSpPr>
-            <a:cxnSpLocks/>
-          </p:cNvCxnSpPr>
-          <p:nvPr/>
-        </p:nvCxnSpPr>
-        <p:spPr>
-          <a:xfrm>
-            <a:off x="766944" y="4644808"/>
-            <a:ext cx="3493213" cy="0"/>
-          </a:xfrm>
-          <a:prstGeom prst="line">
-            <a:avLst/>
-          </a:prstGeom>
-          <a:ln>
-            <a:prstDash val="dash"/>
-          </a:ln>
-        </p:spPr>
-        <p:style>
-          <a:lnRef idx="1">
-            <a:schemeClr val="accent1"/>
-          </a:lnRef>
-          <a:fillRef idx="0">
-            <a:schemeClr val="accent1"/>
-          </a:fillRef>
-          <a:effectRef idx="0">
-            <a:schemeClr val="accent1"/>
-          </a:effectRef>
-          <a:fontRef idx="minor">
-            <a:schemeClr val="tx1"/>
-          </a:fontRef>
-        </p:style>
-      </p:cxnSp>
-      <p:cxnSp>
-        <p:nvCxnSpPr>
-          <p:cNvPr id="53" name="Straight Connector 52">
-            <a:extLst>
-              <a:ext uri="{FF2B5EF4-FFF2-40B4-BE49-F238E27FC236}">
-                <a16:creationId xmlns:a16="http://schemas.microsoft.com/office/drawing/2014/main" id="{884AE8EE-98E1-724A-ABE8-F9638D8EDC7D}"/>
-              </a:ext>
-            </a:extLst>
-          </p:cNvPr>
-          <p:cNvCxnSpPr>
-            <a:cxnSpLocks/>
-          </p:cNvCxnSpPr>
-          <p:nvPr/>
-        </p:nvCxnSpPr>
-        <p:spPr>
-          <a:xfrm>
-            <a:off x="2780677" y="2910187"/>
-            <a:ext cx="0" cy="2671281"/>
-          </a:xfrm>
-          <a:prstGeom prst="line">
-            <a:avLst/>
-          </a:prstGeom>
-          <a:ln>
-            <a:prstDash val="dash"/>
-          </a:ln>
-        </p:spPr>
-        <p:style>
-          <a:lnRef idx="1">
-            <a:schemeClr val="accent1"/>
-          </a:lnRef>
-          <a:fillRef idx="0">
-            <a:schemeClr val="accent1"/>
-          </a:fillRef>
-          <a:effectRef idx="0">
-            <a:schemeClr val="accent1"/>
-          </a:effectRef>
-          <a:fontRef idx="minor">
-            <a:schemeClr val="tx1"/>
-          </a:fontRef>
-        </p:style>
-      </p:cxnSp>
-      <p:cxnSp>
-        <p:nvCxnSpPr>
-          <p:cNvPr id="54" name="Straight Connector 53">
-            <a:extLst>
-              <a:ext uri="{FF2B5EF4-FFF2-40B4-BE49-F238E27FC236}">
-                <a16:creationId xmlns:a16="http://schemas.microsoft.com/office/drawing/2014/main" id="{A42AFFCF-1C30-1F45-8D19-65070470867B}"/>
-              </a:ext>
-            </a:extLst>
-          </p:cNvPr>
-          <p:cNvCxnSpPr>
-            <a:cxnSpLocks/>
-          </p:cNvCxnSpPr>
-          <p:nvPr/>
-        </p:nvCxnSpPr>
-        <p:spPr>
-          <a:xfrm>
-            <a:off x="1792648" y="4667926"/>
-            <a:ext cx="0" cy="913542"/>
-          </a:xfrm>
-          <a:prstGeom prst="line">
-            <a:avLst/>
-          </a:prstGeom>
-          <a:ln>
-            <a:prstDash val="dash"/>
-          </a:ln>
-        </p:spPr>
-        <p:style>
-          <a:lnRef idx="1">
-            <a:schemeClr val="accent1"/>
-          </a:lnRef>
-          <a:fillRef idx="0">
-            <a:schemeClr val="accent1"/>
-          </a:fillRef>
-          <a:effectRef idx="0">
-            <a:schemeClr val="accent1"/>
-          </a:effectRef>
-          <a:fontRef idx="minor">
-            <a:schemeClr val="tx1"/>
-          </a:fontRef>
-        </p:style>
-      </p:cxnSp>
-      <p:sp>
-        <p:nvSpPr>
-          <p:cNvPr id="55" name="TextBox 54">
-            <a:extLst>
-              <a:ext uri="{FF2B5EF4-FFF2-40B4-BE49-F238E27FC236}">
-                <a16:creationId xmlns:a16="http://schemas.microsoft.com/office/drawing/2014/main" id="{E1876040-B571-CB4F-B928-09755D90573D}"/>
-              </a:ext>
-            </a:extLst>
-          </p:cNvPr>
-          <p:cNvSpPr txBox="1"/>
-          <p:nvPr/>
-        </p:nvSpPr>
-        <p:spPr>
-          <a:xfrm>
-            <a:off x="766944" y="1482077"/>
-            <a:ext cx="976549" cy="338554"/>
-          </a:xfrm>
-          <a:prstGeom prst="rect">
-            <a:avLst/>
-          </a:prstGeom>
-          <a:noFill/>
-        </p:spPr>
-        <p:txBody>
-          <a:bodyPr wrap="none" rtlCol="0">
-            <a:spAutoFit/>
-          </a:bodyPr>
-          <a:lstStyle/>
-          <a:p>
-            <a:r>
-              <a:rPr lang="en-US" sz="1600" dirty="0">
-                <a:solidFill>
-                  <a:schemeClr val="accent1"/>
-                </a:solidFill>
-              </a:rPr>
-              <a:t>S1, S2, S3</a:t>
-            </a:r>
-          </a:p>
-        </p:txBody>
-      </p:sp>
-      <p:sp>
-        <p:nvSpPr>
-          <p:cNvPr id="56" name="TextBox 55">
-            <a:extLst>
-              <a:ext uri="{FF2B5EF4-FFF2-40B4-BE49-F238E27FC236}">
-                <a16:creationId xmlns:a16="http://schemas.microsoft.com/office/drawing/2014/main" id="{15863EAA-7E04-8247-95D5-CD5DAB016B68}"/>
-              </a:ext>
-            </a:extLst>
-          </p:cNvPr>
-          <p:cNvSpPr txBox="1"/>
-          <p:nvPr/>
-        </p:nvSpPr>
-        <p:spPr>
-          <a:xfrm>
-            <a:off x="722996" y="2987064"/>
-            <a:ext cx="679994" cy="338554"/>
-          </a:xfrm>
-          <a:prstGeom prst="rect">
-            <a:avLst/>
-          </a:prstGeom>
-          <a:noFill/>
-        </p:spPr>
-        <p:txBody>
-          <a:bodyPr wrap="none" rtlCol="0">
-            <a:spAutoFit/>
-          </a:bodyPr>
-          <a:lstStyle/>
-          <a:p>
-            <a:r>
-              <a:rPr lang="en-US" sz="1600" dirty="0">
-                <a:solidFill>
-                  <a:schemeClr val="accent1"/>
-                </a:solidFill>
-              </a:rPr>
-              <a:t>S1, S3</a:t>
-            </a:r>
-          </a:p>
-        </p:txBody>
-      </p:sp>
-      <p:sp>
-        <p:nvSpPr>
-          <p:cNvPr id="57" name="TextBox 56">
-            <a:extLst>
-              <a:ext uri="{FF2B5EF4-FFF2-40B4-BE49-F238E27FC236}">
-                <a16:creationId xmlns:a16="http://schemas.microsoft.com/office/drawing/2014/main" id="{5A11814A-5D21-9E40-9CCE-2C7B10863B93}"/>
-              </a:ext>
-            </a:extLst>
-          </p:cNvPr>
-          <p:cNvSpPr txBox="1"/>
-          <p:nvPr/>
-        </p:nvSpPr>
-        <p:spPr>
-          <a:xfrm>
-            <a:off x="3854075" y="2987064"/>
-            <a:ext cx="679994" cy="338554"/>
-          </a:xfrm>
-          <a:prstGeom prst="rect">
-            <a:avLst/>
-          </a:prstGeom>
-          <a:noFill/>
-        </p:spPr>
-        <p:txBody>
-          <a:bodyPr wrap="none" rtlCol="0">
-            <a:spAutoFit/>
-          </a:bodyPr>
-          <a:lstStyle/>
-          <a:p>
-            <a:r>
-              <a:rPr lang="en-US" sz="1600" dirty="0">
-                <a:solidFill>
-                  <a:schemeClr val="accent1"/>
-                </a:solidFill>
-              </a:rPr>
-              <a:t>S1, S2</a:t>
-            </a:r>
-          </a:p>
-        </p:txBody>
-      </p:sp>
-      <p:sp>
-        <p:nvSpPr>
-          <p:cNvPr id="58" name="TextBox 57">
-            <a:extLst>
-              <a:ext uri="{FF2B5EF4-FFF2-40B4-BE49-F238E27FC236}">
-                <a16:creationId xmlns:a16="http://schemas.microsoft.com/office/drawing/2014/main" id="{5E3ECC3F-01D2-0945-AE28-9517F5139D57}"/>
-              </a:ext>
-            </a:extLst>
-          </p:cNvPr>
-          <p:cNvSpPr txBox="1"/>
-          <p:nvPr/>
-        </p:nvSpPr>
-        <p:spPr>
-          <a:xfrm>
-            <a:off x="723477" y="4658015"/>
-            <a:ext cx="383438" cy="338554"/>
-          </a:xfrm>
-          <a:prstGeom prst="rect">
-            <a:avLst/>
-          </a:prstGeom>
-          <a:noFill/>
-        </p:spPr>
-        <p:txBody>
-          <a:bodyPr wrap="none" rtlCol="0">
-            <a:spAutoFit/>
-          </a:bodyPr>
-          <a:lstStyle/>
-          <a:p>
-            <a:r>
-              <a:rPr lang="en-US" sz="1600" dirty="0">
-                <a:solidFill>
-                  <a:schemeClr val="accent1"/>
-                </a:solidFill>
-              </a:rPr>
-              <a:t>S1</a:t>
-            </a:r>
-          </a:p>
-        </p:txBody>
-      </p:sp>
-      <p:sp>
-        <p:nvSpPr>
-          <p:cNvPr id="59" name="TextBox 58">
-            <a:extLst>
-              <a:ext uri="{FF2B5EF4-FFF2-40B4-BE49-F238E27FC236}">
-                <a16:creationId xmlns:a16="http://schemas.microsoft.com/office/drawing/2014/main" id="{D4785CD1-861B-3B41-A6B8-D9BB6F7EA423}"/>
-              </a:ext>
-            </a:extLst>
-          </p:cNvPr>
-          <p:cNvSpPr txBox="1"/>
-          <p:nvPr/>
-        </p:nvSpPr>
-        <p:spPr>
-          <a:xfrm>
-            <a:off x="1819516" y="4667926"/>
-            <a:ext cx="383438" cy="338554"/>
-          </a:xfrm>
-          <a:prstGeom prst="rect">
-            <a:avLst/>
-          </a:prstGeom>
-          <a:noFill/>
-        </p:spPr>
-        <p:txBody>
-          <a:bodyPr wrap="none" rtlCol="0">
-            <a:spAutoFit/>
-          </a:bodyPr>
-          <a:lstStyle/>
-          <a:p>
-            <a:r>
-              <a:rPr lang="en-US" sz="1600" dirty="0">
-                <a:solidFill>
-                  <a:schemeClr val="accent1"/>
-                </a:solidFill>
-              </a:rPr>
-              <a:t>S2</a:t>
-            </a:r>
-          </a:p>
-        </p:txBody>
-      </p:sp>
-      <p:sp>
-        <p:nvSpPr>
-          <p:cNvPr id="60" name="TextBox 59">
-            <a:extLst>
-              <a:ext uri="{FF2B5EF4-FFF2-40B4-BE49-F238E27FC236}">
-                <a16:creationId xmlns:a16="http://schemas.microsoft.com/office/drawing/2014/main" id="{BB0F0D35-AF1C-0341-AE38-7C0900D897DB}"/>
-              </a:ext>
-            </a:extLst>
-          </p:cNvPr>
-          <p:cNvSpPr txBox="1"/>
-          <p:nvPr/>
-        </p:nvSpPr>
-        <p:spPr>
-          <a:xfrm>
-            <a:off x="2826186" y="4656183"/>
-            <a:ext cx="383438" cy="338554"/>
-          </a:xfrm>
-          <a:prstGeom prst="rect">
-            <a:avLst/>
-          </a:prstGeom>
-          <a:noFill/>
-        </p:spPr>
-        <p:txBody>
-          <a:bodyPr wrap="none" rtlCol="0">
-            <a:spAutoFit/>
-          </a:bodyPr>
-          <a:lstStyle/>
-          <a:p>
-            <a:r>
-              <a:rPr lang="en-US" sz="1600" dirty="0">
-                <a:solidFill>
-                  <a:schemeClr val="accent1"/>
-                </a:solidFill>
-              </a:rPr>
-              <a:t>S3</a:t>
-            </a:r>
-          </a:p>
-        </p:txBody>
-      </p:sp>
-      <p:sp>
-        <p:nvSpPr>
-          <p:cNvPr id="61" name="Title 60">
-            <a:extLst>
-              <a:ext uri="{FF2B5EF4-FFF2-40B4-BE49-F238E27FC236}">
-                <a16:creationId xmlns:a16="http://schemas.microsoft.com/office/drawing/2014/main" id="{DADF2D13-A876-6641-BA55-9D7873F9FACF}"/>
-              </a:ext>
-            </a:extLst>
-          </p:cNvPr>
-          <p:cNvSpPr>
-            <a:spLocks noGrp="1"/>
-          </p:cNvSpPr>
-          <p:nvPr>
-            <p:ph type="title"/>
-          </p:nvPr>
-        </p:nvSpPr>
-        <p:spPr>
-          <a:xfrm>
-            <a:off x="722996" y="365125"/>
-            <a:ext cx="10630804" cy="357173"/>
-          </a:xfrm>
-        </p:spPr>
-        <p:txBody>
-          <a:bodyPr>
-            <a:noAutofit/>
-          </a:bodyPr>
-          <a:lstStyle/>
-          <a:p>
-            <a:r>
-              <a:rPr lang="en-US" sz="2400" dirty="0"/>
-              <a:t>Clustering first – not great at discriminating clusters within a box</a:t>
-            </a:r>
-          </a:p>
-        </p:txBody>
-      </p:sp>
-      <p:sp>
-        <p:nvSpPr>
-          <p:cNvPr id="62" name="TextBox 61">
-            <a:extLst>
-              <a:ext uri="{FF2B5EF4-FFF2-40B4-BE49-F238E27FC236}">
-                <a16:creationId xmlns:a16="http://schemas.microsoft.com/office/drawing/2014/main" id="{8E8E8D28-B622-E745-906E-881818BCD69E}"/>
-              </a:ext>
-            </a:extLst>
-          </p:cNvPr>
-          <p:cNvSpPr txBox="1"/>
-          <p:nvPr/>
-        </p:nvSpPr>
-        <p:spPr>
-          <a:xfrm>
-            <a:off x="5822334" y="6152409"/>
-            <a:ext cx="4736040" cy="369332"/>
-          </a:xfrm>
-          <a:prstGeom prst="rect">
-            <a:avLst/>
-          </a:prstGeom>
-          <a:noFill/>
-        </p:spPr>
-        <p:txBody>
-          <a:bodyPr wrap="none" rtlCol="0">
-            <a:spAutoFit/>
-          </a:bodyPr>
-          <a:lstStyle/>
-          <a:p>
-            <a:r>
-              <a:rPr lang="en-US" dirty="0"/>
-              <a:t>Simulated data: 100 variants total, 10 per cluster</a:t>
-            </a:r>
-          </a:p>
-        </p:txBody>
-      </p:sp>
     </p:spTree>
     <p:extLst>
       <p:ext uri="{BB962C8B-B14F-4D97-AF65-F5344CB8AC3E}">

</xml_diff>